<commit_message>
add slides and pictures
</commit_message>
<xml_diff>
--- a/Vortrag/hsem.pptx
+++ b/Vortrag/hsem.pptx
@@ -5,13 +5,22 @@
     <p:sldMasterId id="2147483648" r:id="rId1"/>
   </p:sldMasterIdLst>
   <p:sldIdLst>
-    <p:sldId id="257" r:id="rId2"/>
-    <p:sldId id="263" r:id="rId3"/>
-    <p:sldId id="262" r:id="rId4"/>
-    <p:sldId id="259" r:id="rId5"/>
-    <p:sldId id="261" r:id="rId6"/>
-    <p:sldId id="260" r:id="rId7"/>
-    <p:sldId id="258" r:id="rId8"/>
+    <p:sldId id="264" r:id="rId2"/>
+    <p:sldId id="257" r:id="rId3"/>
+    <p:sldId id="263" r:id="rId4"/>
+    <p:sldId id="262" r:id="rId5"/>
+    <p:sldId id="259" r:id="rId6"/>
+    <p:sldId id="261" r:id="rId7"/>
+    <p:sldId id="260" r:id="rId8"/>
+    <p:sldId id="267" r:id="rId9"/>
+    <p:sldId id="266" r:id="rId10"/>
+    <p:sldId id="268" r:id="rId11"/>
+    <p:sldId id="269" r:id="rId12"/>
+    <p:sldId id="270" r:id="rId13"/>
+    <p:sldId id="271" r:id="rId14"/>
+    <p:sldId id="272" r:id="rId15"/>
+    <p:sldId id="273" r:id="rId16"/>
+    <p:sldId id="258" r:id="rId17"/>
   </p:sldIdLst>
   <p:sldSz cx="12192000" cy="6858000"/>
   <p:notesSz cx="6858000" cy="9144000"/>
@@ -110,6 +119,11 @@
       </a:defRPr>
     </a:lvl9pPr>
   </p:defaultTextStyle>
+  <p:extLst>
+    <p:ext uri="{EFAFB233-063F-42B5-8137-9DF3F51BA10A}">
+      <p15:sldGuideLst xmlns:p15="http://schemas.microsoft.com/office/powerpoint/2012/main"/>
+    </p:ext>
+  </p:extLst>
 </p:presentation>
 </file>
 
@@ -2985,11 +2999,7 @@
           <a:bodyPr/>
           <a:lstStyle/>
           <a:p>
-            <a:r>
-              <a:rPr lang="de-DE" dirty="0" smtClean="0"/>
-              <a:t>Agenten und Simulation von AL</a:t>
-            </a:r>
-            <a:endParaRPr lang="de-DE" dirty="0"/>
+            <a:endParaRPr lang="de-DE"/>
           </a:p>
         </p:txBody>
       </p:sp>
@@ -3008,60 +3018,1853 @@
           <a:bodyPr/>
           <a:lstStyle/>
           <a:p>
-            <a:pPr>
-              <a:buFont typeface="Wingdings" panose="05000000000000000000" pitchFamily="2" charset="2"/>
-              <a:buChar char="§"/>
-            </a:pPr>
-            <a:r>
-              <a:rPr lang="de-DE" dirty="0" smtClean="0"/>
-              <a:t>Exkurs: </a:t>
-            </a:r>
-            <a:r>
-              <a:rPr lang="de-DE" dirty="0" err="1" smtClean="0"/>
-              <a:t>Hierarchical</a:t>
-            </a:r>
-            <a:r>
-              <a:rPr lang="de-DE" dirty="0" smtClean="0"/>
-              <a:t> Temporal Memory</a:t>
-            </a:r>
-          </a:p>
-          <a:p>
-            <a:pPr>
-              <a:buFont typeface="Wingdings" panose="05000000000000000000" pitchFamily="2" charset="2"/>
-              <a:buChar char="§"/>
-            </a:pPr>
-            <a:r>
-              <a:rPr lang="de-DE" dirty="0" smtClean="0"/>
-              <a:t>Exkurs: Simulation von Anwendungslandschaften</a:t>
-            </a:r>
-          </a:p>
-          <a:p>
-            <a:pPr>
-              <a:buFont typeface="Wingdings" panose="05000000000000000000" pitchFamily="2" charset="2"/>
-              <a:buChar char="§"/>
-            </a:pPr>
-            <a:r>
-              <a:rPr lang="de-DE" dirty="0" smtClean="0"/>
-              <a:t>Problem Statement</a:t>
-            </a:r>
-          </a:p>
-          <a:p>
-            <a:pPr>
-              <a:buFont typeface="Wingdings" panose="05000000000000000000" pitchFamily="2" charset="2"/>
-              <a:buChar char="§"/>
-            </a:pPr>
-            <a:r>
-              <a:rPr lang="de-DE" dirty="0" smtClean="0"/>
-              <a:t>Roadmap</a:t>
-            </a:r>
-            <a:endParaRPr lang="de-DE" dirty="0"/>
+            <a:endParaRPr lang="de-DE"/>
           </a:p>
         </p:txBody>
       </p:sp>
     </p:spTree>
     <p:extLst>
       <p:ext uri="{BB962C8B-B14F-4D97-AF65-F5344CB8AC3E}">
-        <p14:creationId xmlns:p14="http://schemas.microsoft.com/office/powerpoint/2010/main" val="2839277671"/>
+        <p14:creationId xmlns:p14="http://schemas.microsoft.com/office/powerpoint/2010/main" val="2660602573"/>
+      </p:ext>
+    </p:extLst>
+  </p:cSld>
+  <p:clrMapOvr>
+    <a:masterClrMapping/>
+  </p:clrMapOvr>
+</p:sld>
+</file>
+
+<file path=ppt/slides/slide10.xml><?xml version="1.0" encoding="utf-8"?>
+<p:sld xmlns:a="http://schemas.openxmlformats.org/drawingml/2006/main" xmlns:r="http://schemas.openxmlformats.org/officeDocument/2006/relationships" xmlns:p="http://schemas.openxmlformats.org/presentationml/2006/main">
+  <p:cSld>
+    <p:bg>
+      <p:bgPr>
+        <a:solidFill>
+          <a:schemeClr val="bg1"/>
+        </a:solidFill>
+        <a:effectLst/>
+      </p:bgPr>
+    </p:bg>
+    <p:spTree>
+      <p:nvGrpSpPr>
+        <p:cNvPr id="1" name=""/>
+        <p:cNvGrpSpPr/>
+        <p:nvPr/>
+      </p:nvGrpSpPr>
+      <p:grpSpPr>
+        <a:xfrm>
+          <a:off x="0" y="0"/>
+          <a:ext cx="0" cy="0"/>
+          <a:chOff x="0" y="0"/>
+          <a:chExt cx="0" cy="0"/>
+        </a:xfrm>
+      </p:grpSpPr>
+      <p:pic>
+        <p:nvPicPr>
+          <p:cNvPr id="2" name="Picture 1"/>
+          <p:cNvPicPr>
+            <a:picLocks noChangeAspect="1"/>
+          </p:cNvPicPr>
+          <p:nvPr/>
+        </p:nvPicPr>
+        <p:blipFill>
+          <a:blip r:embed="rId2">
+            <a:extLst>
+              <a:ext uri="{28A0092B-C50C-407E-A947-70E740481C1C}">
+                <a14:useLocalDpi xmlns:a14="http://schemas.microsoft.com/office/drawing/2010/main" val="0"/>
+              </a:ext>
+            </a:extLst>
+          </a:blip>
+          <a:stretch>
+            <a:fillRect/>
+          </a:stretch>
+        </p:blipFill>
+        <p:spPr>
+          <a:xfrm>
+            <a:off x="2684516" y="171289"/>
+            <a:ext cx="6523629" cy="6553417"/>
+          </a:xfrm>
+          <a:prstGeom prst="rect">
+            <a:avLst/>
+          </a:prstGeom>
+        </p:spPr>
+      </p:pic>
+    </p:spTree>
+    <p:extLst>
+      <p:ext uri="{BB962C8B-B14F-4D97-AF65-F5344CB8AC3E}">
+        <p14:creationId xmlns:p14="http://schemas.microsoft.com/office/powerpoint/2010/main" val="2014092846"/>
+      </p:ext>
+    </p:extLst>
+  </p:cSld>
+  <p:clrMapOvr>
+    <a:masterClrMapping/>
+  </p:clrMapOvr>
+</p:sld>
+</file>
+
+<file path=ppt/slides/slide11.xml><?xml version="1.0" encoding="utf-8"?>
+<p:sld xmlns:a="http://schemas.openxmlformats.org/drawingml/2006/main" xmlns:r="http://schemas.openxmlformats.org/officeDocument/2006/relationships" xmlns:p="http://schemas.openxmlformats.org/presentationml/2006/main">
+  <p:cSld>
+    <p:spTree>
+      <p:nvGrpSpPr>
+        <p:cNvPr id="1" name=""/>
+        <p:cNvGrpSpPr/>
+        <p:nvPr/>
+      </p:nvGrpSpPr>
+      <p:grpSpPr>
+        <a:xfrm>
+          <a:off x="0" y="0"/>
+          <a:ext cx="0" cy="0"/>
+          <a:chOff x="0" y="0"/>
+          <a:chExt cx="0" cy="0"/>
+        </a:xfrm>
+      </p:grpSpPr>
+      <p:sp>
+        <p:nvSpPr>
+          <p:cNvPr id="5" name="Rectangle 4"/>
+          <p:cNvSpPr/>
+          <p:nvPr/>
+        </p:nvSpPr>
+        <p:spPr>
+          <a:xfrm>
+            <a:off x="306051" y="4590879"/>
+            <a:ext cx="2715904" cy="1105469"/>
+          </a:xfrm>
+          <a:prstGeom prst="rect">
+            <a:avLst/>
+          </a:prstGeom>
+          <a:noFill/>
+          <a:ln w="57150"/>
+        </p:spPr>
+        <p:style>
+          <a:lnRef idx="2">
+            <a:schemeClr val="accent1">
+              <a:shade val="50000"/>
+            </a:schemeClr>
+          </a:lnRef>
+          <a:fillRef idx="1">
+            <a:schemeClr val="accent1"/>
+          </a:fillRef>
+          <a:effectRef idx="0">
+            <a:schemeClr val="accent1"/>
+          </a:effectRef>
+          <a:fontRef idx="minor">
+            <a:schemeClr val="lt1"/>
+          </a:fontRef>
+        </p:style>
+        <p:txBody>
+          <a:bodyPr rtlCol="0" anchor="ctr"/>
+          <a:lstStyle/>
+          <a:p>
+            <a:pPr algn="ctr"/>
+            <a:r>
+              <a:rPr lang="de-DE" sz="2400" dirty="0" smtClean="0">
+                <a:solidFill>
+                  <a:schemeClr val="tx1"/>
+                </a:solidFill>
+              </a:rPr>
+              <a:t>Region</a:t>
+            </a:r>
+            <a:endParaRPr lang="de-DE" dirty="0">
+              <a:solidFill>
+                <a:schemeClr val="tx1"/>
+              </a:solidFill>
+            </a:endParaRPr>
+          </a:p>
+        </p:txBody>
+      </p:sp>
+      <p:cxnSp>
+        <p:nvCxnSpPr>
+          <p:cNvPr id="7" name="Straight Arrow Connector 6"/>
+          <p:cNvCxnSpPr>
+            <a:stCxn id="23" idx="2"/>
+            <a:endCxn id="20" idx="0"/>
+          </p:cNvCxnSpPr>
+          <p:nvPr/>
+        </p:nvCxnSpPr>
+        <p:spPr>
+          <a:xfrm flipH="1">
+            <a:off x="3096791" y="2259726"/>
+            <a:ext cx="1637732" cy="570931"/>
+          </a:xfrm>
+          <a:prstGeom prst="straightConnector1">
+            <a:avLst/>
+          </a:prstGeom>
+          <a:ln w="57150">
+            <a:headEnd type="triangle" w="med" len="med"/>
+            <a:tailEnd type="triangle" w="med" len="med"/>
+          </a:ln>
+        </p:spPr>
+        <p:style>
+          <a:lnRef idx="1">
+            <a:schemeClr val="accent1"/>
+          </a:lnRef>
+          <a:fillRef idx="0">
+            <a:schemeClr val="accent1"/>
+          </a:fillRef>
+          <a:effectRef idx="0">
+            <a:schemeClr val="accent1"/>
+          </a:effectRef>
+          <a:fontRef idx="minor">
+            <a:schemeClr val="tx1"/>
+          </a:fontRef>
+        </p:style>
+      </p:cxnSp>
+      <p:sp>
+        <p:nvSpPr>
+          <p:cNvPr id="17" name="Rectangle 16"/>
+          <p:cNvSpPr/>
+          <p:nvPr/>
+        </p:nvSpPr>
+        <p:spPr>
+          <a:xfrm>
+            <a:off x="3300939" y="4590877"/>
+            <a:ext cx="2715904" cy="1105469"/>
+          </a:xfrm>
+          <a:prstGeom prst="rect">
+            <a:avLst/>
+          </a:prstGeom>
+          <a:noFill/>
+          <a:ln w="57150"/>
+        </p:spPr>
+        <p:style>
+          <a:lnRef idx="2">
+            <a:schemeClr val="accent1">
+              <a:shade val="50000"/>
+            </a:schemeClr>
+          </a:lnRef>
+          <a:fillRef idx="1">
+            <a:schemeClr val="accent1"/>
+          </a:fillRef>
+          <a:effectRef idx="0">
+            <a:schemeClr val="accent1"/>
+          </a:effectRef>
+          <a:fontRef idx="minor">
+            <a:schemeClr val="lt1"/>
+          </a:fontRef>
+        </p:style>
+        <p:txBody>
+          <a:bodyPr rtlCol="0" anchor="ctr"/>
+          <a:lstStyle/>
+          <a:p>
+            <a:pPr algn="ctr"/>
+            <a:r>
+              <a:rPr lang="de-DE" sz="2400" dirty="0" smtClean="0">
+                <a:solidFill>
+                  <a:schemeClr val="tx1"/>
+                </a:solidFill>
+              </a:rPr>
+              <a:t>Region</a:t>
+            </a:r>
+            <a:endParaRPr lang="de-DE" dirty="0">
+              <a:solidFill>
+                <a:schemeClr val="tx1"/>
+              </a:solidFill>
+            </a:endParaRPr>
+          </a:p>
+        </p:txBody>
+      </p:sp>
+      <p:sp>
+        <p:nvSpPr>
+          <p:cNvPr id="18" name="Rectangle 17"/>
+          <p:cNvSpPr/>
+          <p:nvPr/>
+        </p:nvSpPr>
+        <p:spPr>
+          <a:xfrm>
+            <a:off x="6295827" y="4590877"/>
+            <a:ext cx="2715904" cy="1105469"/>
+          </a:xfrm>
+          <a:prstGeom prst="rect">
+            <a:avLst/>
+          </a:prstGeom>
+          <a:noFill/>
+          <a:ln w="57150"/>
+        </p:spPr>
+        <p:style>
+          <a:lnRef idx="2">
+            <a:schemeClr val="accent1">
+              <a:shade val="50000"/>
+            </a:schemeClr>
+          </a:lnRef>
+          <a:fillRef idx="1">
+            <a:schemeClr val="accent1"/>
+          </a:fillRef>
+          <a:effectRef idx="0">
+            <a:schemeClr val="accent1"/>
+          </a:effectRef>
+          <a:fontRef idx="minor">
+            <a:schemeClr val="lt1"/>
+          </a:fontRef>
+        </p:style>
+        <p:txBody>
+          <a:bodyPr rtlCol="0" anchor="ctr"/>
+          <a:lstStyle/>
+          <a:p>
+            <a:pPr algn="ctr"/>
+            <a:r>
+              <a:rPr lang="de-DE" sz="2400" dirty="0" smtClean="0">
+                <a:solidFill>
+                  <a:schemeClr val="tx1"/>
+                </a:solidFill>
+              </a:rPr>
+              <a:t>Region</a:t>
+            </a:r>
+            <a:endParaRPr lang="de-DE" dirty="0">
+              <a:solidFill>
+                <a:schemeClr val="tx1"/>
+              </a:solidFill>
+            </a:endParaRPr>
+          </a:p>
+        </p:txBody>
+      </p:sp>
+      <p:sp>
+        <p:nvSpPr>
+          <p:cNvPr id="19" name="Rectangle 18"/>
+          <p:cNvSpPr/>
+          <p:nvPr/>
+        </p:nvSpPr>
+        <p:spPr>
+          <a:xfrm>
+            <a:off x="9291511" y="4590876"/>
+            <a:ext cx="2715904" cy="1105469"/>
+          </a:xfrm>
+          <a:prstGeom prst="rect">
+            <a:avLst/>
+          </a:prstGeom>
+          <a:noFill/>
+          <a:ln w="57150"/>
+        </p:spPr>
+        <p:style>
+          <a:lnRef idx="2">
+            <a:schemeClr val="accent1">
+              <a:shade val="50000"/>
+            </a:schemeClr>
+          </a:lnRef>
+          <a:fillRef idx="1">
+            <a:schemeClr val="accent1"/>
+          </a:fillRef>
+          <a:effectRef idx="0">
+            <a:schemeClr val="accent1"/>
+          </a:effectRef>
+          <a:fontRef idx="minor">
+            <a:schemeClr val="lt1"/>
+          </a:fontRef>
+        </p:style>
+        <p:txBody>
+          <a:bodyPr rtlCol="0" anchor="ctr"/>
+          <a:lstStyle/>
+          <a:p>
+            <a:pPr algn="ctr"/>
+            <a:r>
+              <a:rPr lang="de-DE" sz="2400" dirty="0" smtClean="0">
+                <a:solidFill>
+                  <a:schemeClr val="tx1"/>
+                </a:solidFill>
+              </a:rPr>
+              <a:t>Region</a:t>
+            </a:r>
+            <a:endParaRPr lang="de-DE" dirty="0">
+              <a:solidFill>
+                <a:schemeClr val="tx1"/>
+              </a:solidFill>
+            </a:endParaRPr>
+          </a:p>
+        </p:txBody>
+      </p:sp>
+      <p:sp>
+        <p:nvSpPr>
+          <p:cNvPr id="20" name="Rectangle 19"/>
+          <p:cNvSpPr/>
+          <p:nvPr/>
+        </p:nvSpPr>
+        <p:spPr>
+          <a:xfrm>
+            <a:off x="1738839" y="2830657"/>
+            <a:ext cx="2715904" cy="1105469"/>
+          </a:xfrm>
+          <a:prstGeom prst="rect">
+            <a:avLst/>
+          </a:prstGeom>
+          <a:noFill/>
+          <a:ln w="57150"/>
+        </p:spPr>
+        <p:style>
+          <a:lnRef idx="2">
+            <a:schemeClr val="accent1">
+              <a:shade val="50000"/>
+            </a:schemeClr>
+          </a:lnRef>
+          <a:fillRef idx="1">
+            <a:schemeClr val="accent1"/>
+          </a:fillRef>
+          <a:effectRef idx="0">
+            <a:schemeClr val="accent1"/>
+          </a:effectRef>
+          <a:fontRef idx="minor">
+            <a:schemeClr val="lt1"/>
+          </a:fontRef>
+        </p:style>
+        <p:txBody>
+          <a:bodyPr rtlCol="0" anchor="ctr"/>
+          <a:lstStyle/>
+          <a:p>
+            <a:pPr algn="ctr"/>
+            <a:r>
+              <a:rPr lang="de-DE" sz="2400" dirty="0" smtClean="0">
+                <a:solidFill>
+                  <a:schemeClr val="tx1"/>
+                </a:solidFill>
+              </a:rPr>
+              <a:t>Region</a:t>
+            </a:r>
+            <a:endParaRPr lang="de-DE" dirty="0">
+              <a:solidFill>
+                <a:schemeClr val="tx1"/>
+              </a:solidFill>
+            </a:endParaRPr>
+          </a:p>
+        </p:txBody>
+      </p:sp>
+      <p:sp>
+        <p:nvSpPr>
+          <p:cNvPr id="21" name="Rectangle 20"/>
+          <p:cNvSpPr/>
+          <p:nvPr/>
+        </p:nvSpPr>
+        <p:spPr>
+          <a:xfrm>
+            <a:off x="4733727" y="2830657"/>
+            <a:ext cx="2715904" cy="1105469"/>
+          </a:xfrm>
+          <a:prstGeom prst="rect">
+            <a:avLst/>
+          </a:prstGeom>
+          <a:noFill/>
+          <a:ln w="57150"/>
+        </p:spPr>
+        <p:style>
+          <a:lnRef idx="2">
+            <a:schemeClr val="accent1">
+              <a:shade val="50000"/>
+            </a:schemeClr>
+          </a:lnRef>
+          <a:fillRef idx="1">
+            <a:schemeClr val="accent1"/>
+          </a:fillRef>
+          <a:effectRef idx="0">
+            <a:schemeClr val="accent1"/>
+          </a:effectRef>
+          <a:fontRef idx="minor">
+            <a:schemeClr val="lt1"/>
+          </a:fontRef>
+        </p:style>
+        <p:txBody>
+          <a:bodyPr rtlCol="0" anchor="ctr"/>
+          <a:lstStyle/>
+          <a:p>
+            <a:pPr algn="ctr"/>
+            <a:r>
+              <a:rPr lang="de-DE" sz="2400" dirty="0" smtClean="0">
+                <a:solidFill>
+                  <a:schemeClr val="tx1"/>
+                </a:solidFill>
+              </a:rPr>
+              <a:t>Region</a:t>
+            </a:r>
+            <a:endParaRPr lang="de-DE" dirty="0">
+              <a:solidFill>
+                <a:schemeClr val="tx1"/>
+              </a:solidFill>
+            </a:endParaRPr>
+          </a:p>
+        </p:txBody>
+      </p:sp>
+      <p:sp>
+        <p:nvSpPr>
+          <p:cNvPr id="22" name="Rectangle 21"/>
+          <p:cNvSpPr/>
+          <p:nvPr/>
+        </p:nvSpPr>
+        <p:spPr>
+          <a:xfrm>
+            <a:off x="7729411" y="2830656"/>
+            <a:ext cx="2715904" cy="1105469"/>
+          </a:xfrm>
+          <a:prstGeom prst="rect">
+            <a:avLst/>
+          </a:prstGeom>
+          <a:noFill/>
+          <a:ln w="57150"/>
+        </p:spPr>
+        <p:style>
+          <a:lnRef idx="2">
+            <a:schemeClr val="accent1">
+              <a:shade val="50000"/>
+            </a:schemeClr>
+          </a:lnRef>
+          <a:fillRef idx="1">
+            <a:schemeClr val="accent1"/>
+          </a:fillRef>
+          <a:effectRef idx="0">
+            <a:schemeClr val="accent1"/>
+          </a:effectRef>
+          <a:fontRef idx="minor">
+            <a:schemeClr val="lt1"/>
+          </a:fontRef>
+        </p:style>
+        <p:txBody>
+          <a:bodyPr rtlCol="0" anchor="ctr"/>
+          <a:lstStyle/>
+          <a:p>
+            <a:pPr algn="ctr"/>
+            <a:r>
+              <a:rPr lang="de-DE" sz="2400" dirty="0" smtClean="0">
+                <a:solidFill>
+                  <a:schemeClr val="tx1"/>
+                </a:solidFill>
+              </a:rPr>
+              <a:t>Region</a:t>
+            </a:r>
+            <a:endParaRPr lang="de-DE" dirty="0">
+              <a:solidFill>
+                <a:schemeClr val="tx1"/>
+              </a:solidFill>
+            </a:endParaRPr>
+          </a:p>
+        </p:txBody>
+      </p:sp>
+      <p:sp>
+        <p:nvSpPr>
+          <p:cNvPr id="23" name="Rectangle 22"/>
+          <p:cNvSpPr/>
+          <p:nvPr/>
+        </p:nvSpPr>
+        <p:spPr>
+          <a:xfrm>
+            <a:off x="3376571" y="1154257"/>
+            <a:ext cx="2715904" cy="1105469"/>
+          </a:xfrm>
+          <a:prstGeom prst="rect">
+            <a:avLst/>
+          </a:prstGeom>
+          <a:noFill/>
+          <a:ln w="57150"/>
+        </p:spPr>
+        <p:style>
+          <a:lnRef idx="2">
+            <a:schemeClr val="accent1">
+              <a:shade val="50000"/>
+            </a:schemeClr>
+          </a:lnRef>
+          <a:fillRef idx="1">
+            <a:schemeClr val="accent1"/>
+          </a:fillRef>
+          <a:effectRef idx="0">
+            <a:schemeClr val="accent1"/>
+          </a:effectRef>
+          <a:fontRef idx="minor">
+            <a:schemeClr val="lt1"/>
+          </a:fontRef>
+        </p:style>
+        <p:txBody>
+          <a:bodyPr rtlCol="0" anchor="ctr"/>
+          <a:lstStyle/>
+          <a:p>
+            <a:pPr algn="ctr"/>
+            <a:r>
+              <a:rPr lang="de-DE" sz="2400" dirty="0" smtClean="0">
+                <a:solidFill>
+                  <a:schemeClr val="tx1"/>
+                </a:solidFill>
+              </a:rPr>
+              <a:t>Region</a:t>
+            </a:r>
+            <a:endParaRPr lang="de-DE" dirty="0">
+              <a:solidFill>
+                <a:schemeClr val="tx1"/>
+              </a:solidFill>
+            </a:endParaRPr>
+          </a:p>
+        </p:txBody>
+      </p:sp>
+      <p:sp>
+        <p:nvSpPr>
+          <p:cNvPr id="24" name="Rectangle 23"/>
+          <p:cNvSpPr/>
+          <p:nvPr/>
+        </p:nvSpPr>
+        <p:spPr>
+          <a:xfrm>
+            <a:off x="6371459" y="1154257"/>
+            <a:ext cx="2715904" cy="1105469"/>
+          </a:xfrm>
+          <a:prstGeom prst="rect">
+            <a:avLst/>
+          </a:prstGeom>
+          <a:noFill/>
+          <a:ln w="57150"/>
+        </p:spPr>
+        <p:style>
+          <a:lnRef idx="2">
+            <a:schemeClr val="accent1">
+              <a:shade val="50000"/>
+            </a:schemeClr>
+          </a:lnRef>
+          <a:fillRef idx="1">
+            <a:schemeClr val="accent1"/>
+          </a:fillRef>
+          <a:effectRef idx="0">
+            <a:schemeClr val="accent1"/>
+          </a:effectRef>
+          <a:fontRef idx="minor">
+            <a:schemeClr val="lt1"/>
+          </a:fontRef>
+        </p:style>
+        <p:txBody>
+          <a:bodyPr rtlCol="0" anchor="ctr"/>
+          <a:lstStyle/>
+          <a:p>
+            <a:pPr algn="ctr"/>
+            <a:r>
+              <a:rPr lang="de-DE" sz="2400" dirty="0" smtClean="0">
+                <a:solidFill>
+                  <a:schemeClr val="tx1"/>
+                </a:solidFill>
+              </a:rPr>
+              <a:t>Region</a:t>
+            </a:r>
+            <a:endParaRPr lang="de-DE" dirty="0">
+              <a:solidFill>
+                <a:schemeClr val="tx1"/>
+              </a:solidFill>
+            </a:endParaRPr>
+          </a:p>
+        </p:txBody>
+      </p:sp>
+      <p:cxnSp>
+        <p:nvCxnSpPr>
+          <p:cNvPr id="27" name="Straight Arrow Connector 26"/>
+          <p:cNvCxnSpPr>
+            <a:stCxn id="23" idx="2"/>
+            <a:endCxn id="21" idx="0"/>
+          </p:cNvCxnSpPr>
+          <p:nvPr/>
+        </p:nvCxnSpPr>
+        <p:spPr>
+          <a:xfrm>
+            <a:off x="4734523" y="2259726"/>
+            <a:ext cx="1357156" cy="570931"/>
+          </a:xfrm>
+          <a:prstGeom prst="straightConnector1">
+            <a:avLst/>
+          </a:prstGeom>
+          <a:ln w="57150">
+            <a:headEnd type="triangle" w="med" len="med"/>
+            <a:tailEnd type="triangle" w="med" len="med"/>
+          </a:ln>
+        </p:spPr>
+        <p:style>
+          <a:lnRef idx="1">
+            <a:schemeClr val="accent1"/>
+          </a:lnRef>
+          <a:fillRef idx="0">
+            <a:schemeClr val="accent1"/>
+          </a:fillRef>
+          <a:effectRef idx="0">
+            <a:schemeClr val="accent1"/>
+          </a:effectRef>
+          <a:fontRef idx="minor">
+            <a:schemeClr val="tx1"/>
+          </a:fontRef>
+        </p:style>
+      </p:cxnSp>
+      <p:cxnSp>
+        <p:nvCxnSpPr>
+          <p:cNvPr id="30" name="Straight Arrow Connector 29"/>
+          <p:cNvCxnSpPr>
+            <a:stCxn id="24" idx="2"/>
+            <a:endCxn id="21" idx="0"/>
+          </p:cNvCxnSpPr>
+          <p:nvPr/>
+        </p:nvCxnSpPr>
+        <p:spPr>
+          <a:xfrm flipH="1">
+            <a:off x="6091679" y="2259726"/>
+            <a:ext cx="1637732" cy="570931"/>
+          </a:xfrm>
+          <a:prstGeom prst="straightConnector1">
+            <a:avLst/>
+          </a:prstGeom>
+          <a:ln w="57150">
+            <a:headEnd type="triangle" w="med" len="med"/>
+            <a:tailEnd type="triangle" w="med" len="med"/>
+          </a:ln>
+        </p:spPr>
+        <p:style>
+          <a:lnRef idx="1">
+            <a:schemeClr val="accent1"/>
+          </a:lnRef>
+          <a:fillRef idx="0">
+            <a:schemeClr val="accent1"/>
+          </a:fillRef>
+          <a:effectRef idx="0">
+            <a:schemeClr val="accent1"/>
+          </a:effectRef>
+          <a:fontRef idx="minor">
+            <a:schemeClr val="tx1"/>
+          </a:fontRef>
+        </p:style>
+      </p:cxnSp>
+      <p:cxnSp>
+        <p:nvCxnSpPr>
+          <p:cNvPr id="33" name="Straight Arrow Connector 32"/>
+          <p:cNvCxnSpPr>
+            <a:stCxn id="24" idx="2"/>
+            <a:endCxn id="22" idx="0"/>
+          </p:cNvCxnSpPr>
+          <p:nvPr/>
+        </p:nvCxnSpPr>
+        <p:spPr>
+          <a:xfrm>
+            <a:off x="7729411" y="2259726"/>
+            <a:ext cx="1357952" cy="570930"/>
+          </a:xfrm>
+          <a:prstGeom prst="straightConnector1">
+            <a:avLst/>
+          </a:prstGeom>
+          <a:ln w="57150">
+            <a:headEnd type="triangle" w="med" len="med"/>
+            <a:tailEnd type="triangle" w="med" len="med"/>
+          </a:ln>
+        </p:spPr>
+        <p:style>
+          <a:lnRef idx="1">
+            <a:schemeClr val="accent1"/>
+          </a:lnRef>
+          <a:fillRef idx="0">
+            <a:schemeClr val="accent1"/>
+          </a:fillRef>
+          <a:effectRef idx="0">
+            <a:schemeClr val="accent1"/>
+          </a:effectRef>
+          <a:fontRef idx="minor">
+            <a:schemeClr val="tx1"/>
+          </a:fontRef>
+        </p:style>
+      </p:cxnSp>
+      <p:cxnSp>
+        <p:nvCxnSpPr>
+          <p:cNvPr id="36" name="Straight Arrow Connector 35"/>
+          <p:cNvCxnSpPr>
+            <a:stCxn id="20" idx="2"/>
+            <a:endCxn id="17" idx="0"/>
+          </p:cNvCxnSpPr>
+          <p:nvPr/>
+        </p:nvCxnSpPr>
+        <p:spPr>
+          <a:xfrm>
+            <a:off x="3096791" y="3936126"/>
+            <a:ext cx="1562100" cy="654751"/>
+          </a:xfrm>
+          <a:prstGeom prst="straightConnector1">
+            <a:avLst/>
+          </a:prstGeom>
+          <a:ln w="57150">
+            <a:headEnd type="triangle" w="med" len="med"/>
+            <a:tailEnd type="triangle" w="med" len="med"/>
+          </a:ln>
+        </p:spPr>
+        <p:style>
+          <a:lnRef idx="1">
+            <a:schemeClr val="accent1"/>
+          </a:lnRef>
+          <a:fillRef idx="0">
+            <a:schemeClr val="accent1"/>
+          </a:fillRef>
+          <a:effectRef idx="0">
+            <a:schemeClr val="accent1"/>
+          </a:effectRef>
+          <a:fontRef idx="minor">
+            <a:schemeClr val="tx1"/>
+          </a:fontRef>
+        </p:style>
+      </p:cxnSp>
+      <p:cxnSp>
+        <p:nvCxnSpPr>
+          <p:cNvPr id="39" name="Straight Arrow Connector 38"/>
+          <p:cNvCxnSpPr>
+            <a:stCxn id="20" idx="2"/>
+            <a:endCxn id="5" idx="0"/>
+          </p:cNvCxnSpPr>
+          <p:nvPr/>
+        </p:nvCxnSpPr>
+        <p:spPr>
+          <a:xfrm flipH="1">
+            <a:off x="1664003" y="3936126"/>
+            <a:ext cx="1432788" cy="654753"/>
+          </a:xfrm>
+          <a:prstGeom prst="straightConnector1">
+            <a:avLst/>
+          </a:prstGeom>
+          <a:ln w="57150">
+            <a:headEnd type="triangle" w="med" len="med"/>
+            <a:tailEnd type="triangle" w="med" len="med"/>
+          </a:ln>
+        </p:spPr>
+        <p:style>
+          <a:lnRef idx="1">
+            <a:schemeClr val="accent1"/>
+          </a:lnRef>
+          <a:fillRef idx="0">
+            <a:schemeClr val="accent1"/>
+          </a:fillRef>
+          <a:effectRef idx="0">
+            <a:schemeClr val="accent1"/>
+          </a:effectRef>
+          <a:fontRef idx="minor">
+            <a:schemeClr val="tx1"/>
+          </a:fontRef>
+        </p:style>
+      </p:cxnSp>
+      <p:cxnSp>
+        <p:nvCxnSpPr>
+          <p:cNvPr id="42" name="Straight Arrow Connector 41"/>
+          <p:cNvCxnSpPr>
+            <a:stCxn id="21" idx="2"/>
+            <a:endCxn id="17" idx="0"/>
+          </p:cNvCxnSpPr>
+          <p:nvPr/>
+        </p:nvCxnSpPr>
+        <p:spPr>
+          <a:xfrm flipH="1">
+            <a:off x="4658891" y="3936126"/>
+            <a:ext cx="1432788" cy="654751"/>
+          </a:xfrm>
+          <a:prstGeom prst="straightConnector1">
+            <a:avLst/>
+          </a:prstGeom>
+          <a:ln w="57150">
+            <a:headEnd type="triangle" w="med" len="med"/>
+            <a:tailEnd type="triangle" w="med" len="med"/>
+          </a:ln>
+        </p:spPr>
+        <p:style>
+          <a:lnRef idx="1">
+            <a:schemeClr val="accent1"/>
+          </a:lnRef>
+          <a:fillRef idx="0">
+            <a:schemeClr val="accent1"/>
+          </a:fillRef>
+          <a:effectRef idx="0">
+            <a:schemeClr val="accent1"/>
+          </a:effectRef>
+          <a:fontRef idx="minor">
+            <a:schemeClr val="tx1"/>
+          </a:fontRef>
+        </p:style>
+      </p:cxnSp>
+      <p:cxnSp>
+        <p:nvCxnSpPr>
+          <p:cNvPr id="45" name="Straight Arrow Connector 44"/>
+          <p:cNvCxnSpPr>
+            <a:stCxn id="21" idx="2"/>
+            <a:endCxn id="18" idx="0"/>
+          </p:cNvCxnSpPr>
+          <p:nvPr/>
+        </p:nvCxnSpPr>
+        <p:spPr>
+          <a:xfrm>
+            <a:off x="6091679" y="3936126"/>
+            <a:ext cx="1562100" cy="654751"/>
+          </a:xfrm>
+          <a:prstGeom prst="straightConnector1">
+            <a:avLst/>
+          </a:prstGeom>
+          <a:ln w="57150">
+            <a:headEnd type="triangle" w="med" len="med"/>
+            <a:tailEnd type="triangle" w="med" len="med"/>
+          </a:ln>
+        </p:spPr>
+        <p:style>
+          <a:lnRef idx="1">
+            <a:schemeClr val="accent1"/>
+          </a:lnRef>
+          <a:fillRef idx="0">
+            <a:schemeClr val="accent1"/>
+          </a:fillRef>
+          <a:effectRef idx="0">
+            <a:schemeClr val="accent1"/>
+          </a:effectRef>
+          <a:fontRef idx="minor">
+            <a:schemeClr val="tx1"/>
+          </a:fontRef>
+        </p:style>
+      </p:cxnSp>
+      <p:cxnSp>
+        <p:nvCxnSpPr>
+          <p:cNvPr id="48" name="Straight Arrow Connector 47"/>
+          <p:cNvCxnSpPr>
+            <a:stCxn id="22" idx="2"/>
+            <a:endCxn id="19" idx="0"/>
+          </p:cNvCxnSpPr>
+          <p:nvPr/>
+        </p:nvCxnSpPr>
+        <p:spPr>
+          <a:xfrm>
+            <a:off x="9087363" y="3936125"/>
+            <a:ext cx="1562100" cy="654751"/>
+          </a:xfrm>
+          <a:prstGeom prst="straightConnector1">
+            <a:avLst/>
+          </a:prstGeom>
+          <a:ln w="57150">
+            <a:headEnd type="triangle" w="med" len="med"/>
+            <a:tailEnd type="triangle" w="med" len="med"/>
+          </a:ln>
+        </p:spPr>
+        <p:style>
+          <a:lnRef idx="1">
+            <a:schemeClr val="accent1"/>
+          </a:lnRef>
+          <a:fillRef idx="0">
+            <a:schemeClr val="accent1"/>
+          </a:fillRef>
+          <a:effectRef idx="0">
+            <a:schemeClr val="accent1"/>
+          </a:effectRef>
+          <a:fontRef idx="minor">
+            <a:schemeClr val="tx1"/>
+          </a:fontRef>
+        </p:style>
+      </p:cxnSp>
+      <p:cxnSp>
+        <p:nvCxnSpPr>
+          <p:cNvPr id="51" name="Straight Arrow Connector 50"/>
+          <p:cNvCxnSpPr>
+            <a:stCxn id="18" idx="0"/>
+            <a:endCxn id="22" idx="2"/>
+          </p:cNvCxnSpPr>
+          <p:nvPr/>
+        </p:nvCxnSpPr>
+        <p:spPr>
+          <a:xfrm flipV="1">
+            <a:off x="7653779" y="3936125"/>
+            <a:ext cx="1433584" cy="654752"/>
+          </a:xfrm>
+          <a:prstGeom prst="straightConnector1">
+            <a:avLst/>
+          </a:prstGeom>
+          <a:ln w="57150">
+            <a:headEnd type="triangle" w="med" len="med"/>
+            <a:tailEnd type="triangle" w="med" len="med"/>
+          </a:ln>
+        </p:spPr>
+        <p:style>
+          <a:lnRef idx="1">
+            <a:schemeClr val="accent1"/>
+          </a:lnRef>
+          <a:fillRef idx="0">
+            <a:schemeClr val="accent1"/>
+          </a:fillRef>
+          <a:effectRef idx="0">
+            <a:schemeClr val="accent1"/>
+          </a:effectRef>
+          <a:fontRef idx="minor">
+            <a:schemeClr val="tx1"/>
+          </a:fontRef>
+        </p:style>
+      </p:cxnSp>
+      <p:cxnSp>
+        <p:nvCxnSpPr>
+          <p:cNvPr id="54" name="Straight Arrow Connector 53"/>
+          <p:cNvCxnSpPr>
+            <a:stCxn id="5" idx="2"/>
+          </p:cNvCxnSpPr>
+          <p:nvPr/>
+        </p:nvCxnSpPr>
+        <p:spPr>
+          <a:xfrm>
+            <a:off x="1664003" y="5696348"/>
+            <a:ext cx="0" cy="872092"/>
+          </a:xfrm>
+          <a:prstGeom prst="straightConnector1">
+            <a:avLst/>
+          </a:prstGeom>
+          <a:ln w="57150">
+            <a:headEnd type="triangle" w="med" len="med"/>
+            <a:tailEnd type="triangle" w="med" len="med"/>
+          </a:ln>
+        </p:spPr>
+        <p:style>
+          <a:lnRef idx="1">
+            <a:schemeClr val="accent1"/>
+          </a:lnRef>
+          <a:fillRef idx="0">
+            <a:schemeClr val="accent1"/>
+          </a:fillRef>
+          <a:effectRef idx="0">
+            <a:schemeClr val="accent1"/>
+          </a:effectRef>
+          <a:fontRef idx="minor">
+            <a:schemeClr val="tx1"/>
+          </a:fontRef>
+        </p:style>
+      </p:cxnSp>
+      <p:cxnSp>
+        <p:nvCxnSpPr>
+          <p:cNvPr id="57" name="Straight Arrow Connector 56"/>
+          <p:cNvCxnSpPr/>
+          <p:nvPr/>
+        </p:nvCxnSpPr>
+        <p:spPr>
+          <a:xfrm>
+            <a:off x="4658891" y="5696345"/>
+            <a:ext cx="0" cy="872092"/>
+          </a:xfrm>
+          <a:prstGeom prst="straightConnector1">
+            <a:avLst/>
+          </a:prstGeom>
+          <a:ln w="57150">
+            <a:headEnd type="triangle" w="med" len="med"/>
+            <a:tailEnd type="triangle" w="med" len="med"/>
+          </a:ln>
+        </p:spPr>
+        <p:style>
+          <a:lnRef idx="1">
+            <a:schemeClr val="accent1"/>
+          </a:lnRef>
+          <a:fillRef idx="0">
+            <a:schemeClr val="accent1"/>
+          </a:fillRef>
+          <a:effectRef idx="0">
+            <a:schemeClr val="accent1"/>
+          </a:effectRef>
+          <a:fontRef idx="minor">
+            <a:schemeClr val="tx1"/>
+          </a:fontRef>
+        </p:style>
+      </p:cxnSp>
+      <p:cxnSp>
+        <p:nvCxnSpPr>
+          <p:cNvPr id="58" name="Straight Arrow Connector 57"/>
+          <p:cNvCxnSpPr/>
+          <p:nvPr/>
+        </p:nvCxnSpPr>
+        <p:spPr>
+          <a:xfrm>
+            <a:off x="7649002" y="5696345"/>
+            <a:ext cx="0" cy="872092"/>
+          </a:xfrm>
+          <a:prstGeom prst="straightConnector1">
+            <a:avLst/>
+          </a:prstGeom>
+          <a:ln w="57150">
+            <a:headEnd type="triangle" w="med" len="med"/>
+            <a:tailEnd type="triangle" w="med" len="med"/>
+          </a:ln>
+        </p:spPr>
+        <p:style>
+          <a:lnRef idx="1">
+            <a:schemeClr val="accent1"/>
+          </a:lnRef>
+          <a:fillRef idx="0">
+            <a:schemeClr val="accent1"/>
+          </a:fillRef>
+          <a:effectRef idx="0">
+            <a:schemeClr val="accent1"/>
+          </a:effectRef>
+          <a:fontRef idx="minor">
+            <a:schemeClr val="tx1"/>
+          </a:fontRef>
+        </p:style>
+      </p:cxnSp>
+      <p:cxnSp>
+        <p:nvCxnSpPr>
+          <p:cNvPr id="59" name="Straight Arrow Connector 58"/>
+          <p:cNvCxnSpPr/>
+          <p:nvPr/>
+        </p:nvCxnSpPr>
+        <p:spPr>
+          <a:xfrm>
+            <a:off x="10649463" y="5696345"/>
+            <a:ext cx="0" cy="872092"/>
+          </a:xfrm>
+          <a:prstGeom prst="straightConnector1">
+            <a:avLst/>
+          </a:prstGeom>
+          <a:ln w="57150">
+            <a:headEnd type="triangle" w="med" len="med"/>
+            <a:tailEnd type="triangle" w="med" len="med"/>
+          </a:ln>
+        </p:spPr>
+        <p:style>
+          <a:lnRef idx="1">
+            <a:schemeClr val="accent1"/>
+          </a:lnRef>
+          <a:fillRef idx="0">
+            <a:schemeClr val="accent1"/>
+          </a:fillRef>
+          <a:effectRef idx="0">
+            <a:schemeClr val="accent1"/>
+          </a:effectRef>
+          <a:fontRef idx="minor">
+            <a:schemeClr val="tx1"/>
+          </a:fontRef>
+        </p:style>
+      </p:cxnSp>
+      <p:sp>
+        <p:nvSpPr>
+          <p:cNvPr id="60" name="TextBox 59"/>
+          <p:cNvSpPr txBox="1"/>
+          <p:nvPr/>
+        </p:nvSpPr>
+        <p:spPr>
+          <a:xfrm>
+            <a:off x="132383" y="234324"/>
+            <a:ext cx="4188519" cy="461665"/>
+          </a:xfrm>
+          <a:prstGeom prst="rect">
+            <a:avLst/>
+          </a:prstGeom>
+          <a:noFill/>
+        </p:spPr>
+        <p:txBody>
+          <a:bodyPr wrap="none" rtlCol="0">
+            <a:spAutoFit/>
+          </a:bodyPr>
+          <a:lstStyle/>
+          <a:p>
+            <a:r>
+              <a:rPr lang="de-DE" sz="2400" b="1" dirty="0" smtClean="0"/>
+              <a:t>Unser Neocortex-Modell bisher</a:t>
+            </a:r>
+            <a:endParaRPr lang="de-DE" sz="2400" b="1" dirty="0"/>
+          </a:p>
+        </p:txBody>
+      </p:sp>
+    </p:spTree>
+    <p:extLst>
+      <p:ext uri="{BB962C8B-B14F-4D97-AF65-F5344CB8AC3E}">
+        <p14:creationId xmlns:p14="http://schemas.microsoft.com/office/powerpoint/2010/main" val="2326234285"/>
+      </p:ext>
+    </p:extLst>
+  </p:cSld>
+  <p:clrMapOvr>
+    <a:masterClrMapping/>
+  </p:clrMapOvr>
+</p:sld>
+</file>
+
+<file path=ppt/slides/slide12.xml><?xml version="1.0" encoding="utf-8"?>
+<p:sld xmlns:a="http://schemas.openxmlformats.org/drawingml/2006/main" xmlns:r="http://schemas.openxmlformats.org/officeDocument/2006/relationships" xmlns:p="http://schemas.openxmlformats.org/presentationml/2006/main">
+  <p:cSld>
+    <p:spTree>
+      <p:nvGrpSpPr>
+        <p:cNvPr id="1" name=""/>
+        <p:cNvGrpSpPr/>
+        <p:nvPr/>
+      </p:nvGrpSpPr>
+      <p:grpSpPr>
+        <a:xfrm>
+          <a:off x="0" y="0"/>
+          <a:ext cx="0" cy="0"/>
+          <a:chOff x="0" y="0"/>
+          <a:chExt cx="0" cy="0"/>
+        </a:xfrm>
+      </p:grpSpPr>
+      <p:pic>
+        <p:nvPicPr>
+          <p:cNvPr id="2" name="Picture 1"/>
+          <p:cNvPicPr>
+            <a:picLocks noChangeAspect="1"/>
+          </p:cNvPicPr>
+          <p:nvPr/>
+        </p:nvPicPr>
+        <p:blipFill>
+          <a:blip r:embed="rId2">
+            <a:extLst>
+              <a:ext uri="{28A0092B-C50C-407E-A947-70E740481C1C}">
+                <a14:useLocalDpi xmlns:a14="http://schemas.microsoft.com/office/drawing/2010/main" val="0"/>
+              </a:ext>
+            </a:extLst>
+          </a:blip>
+          <a:stretch>
+            <a:fillRect/>
+          </a:stretch>
+        </p:blipFill>
+        <p:spPr>
+          <a:xfrm>
+            <a:off x="5613175" y="1042235"/>
+            <a:ext cx="6578825" cy="5791200"/>
+          </a:xfrm>
+          <a:prstGeom prst="rect">
+            <a:avLst/>
+          </a:prstGeom>
+        </p:spPr>
+      </p:pic>
+      <p:sp>
+        <p:nvSpPr>
+          <p:cNvPr id="5" name="Rectangle 4"/>
+          <p:cNvSpPr/>
+          <p:nvPr/>
+        </p:nvSpPr>
+        <p:spPr>
+          <a:xfrm>
+            <a:off x="306050" y="1127761"/>
+            <a:ext cx="5226069" cy="4568588"/>
+          </a:xfrm>
+          <a:prstGeom prst="rect">
+            <a:avLst/>
+          </a:prstGeom>
+          <a:solidFill>
+            <a:schemeClr val="bg1"/>
+          </a:solidFill>
+          <a:ln w="57150"/>
+        </p:spPr>
+        <p:style>
+          <a:lnRef idx="2">
+            <a:schemeClr val="accent1">
+              <a:shade val="50000"/>
+            </a:schemeClr>
+          </a:lnRef>
+          <a:fillRef idx="1">
+            <a:schemeClr val="accent1"/>
+          </a:fillRef>
+          <a:effectRef idx="0">
+            <a:schemeClr val="accent1"/>
+          </a:effectRef>
+          <a:fontRef idx="minor">
+            <a:schemeClr val="lt1"/>
+          </a:fontRef>
+        </p:style>
+        <p:txBody>
+          <a:bodyPr rtlCol="0" anchor="ctr"/>
+          <a:lstStyle/>
+          <a:p>
+            <a:pPr algn="ctr"/>
+            <a:r>
+              <a:rPr lang="de-DE" sz="2400" dirty="0" smtClean="0">
+                <a:solidFill>
+                  <a:schemeClr val="tx1"/>
+                </a:solidFill>
+              </a:rPr>
+              <a:t>Region</a:t>
+            </a:r>
+            <a:endParaRPr lang="de-DE" dirty="0">
+              <a:solidFill>
+                <a:schemeClr val="tx1"/>
+              </a:solidFill>
+            </a:endParaRPr>
+          </a:p>
+        </p:txBody>
+      </p:sp>
+      <p:sp>
+        <p:nvSpPr>
+          <p:cNvPr id="60" name="TextBox 59"/>
+          <p:cNvSpPr txBox="1"/>
+          <p:nvPr/>
+        </p:nvSpPr>
+        <p:spPr>
+          <a:xfrm>
+            <a:off x="132383" y="234324"/>
+            <a:ext cx="3196003" cy="461665"/>
+          </a:xfrm>
+          <a:prstGeom prst="rect">
+            <a:avLst/>
+          </a:prstGeom>
+          <a:noFill/>
+        </p:spPr>
+        <p:txBody>
+          <a:bodyPr wrap="none" rtlCol="0">
+            <a:spAutoFit/>
+          </a:bodyPr>
+          <a:lstStyle/>
+          <a:p>
+            <a:r>
+              <a:rPr lang="de-DE" sz="2400" b="1" dirty="0" smtClean="0"/>
+              <a:t>Schichten im Neocortex</a:t>
+            </a:r>
+            <a:endParaRPr lang="de-DE" sz="2400" b="1" dirty="0"/>
+          </a:p>
+        </p:txBody>
+      </p:sp>
+    </p:spTree>
+    <p:extLst>
+      <p:ext uri="{BB962C8B-B14F-4D97-AF65-F5344CB8AC3E}">
+        <p14:creationId xmlns:p14="http://schemas.microsoft.com/office/powerpoint/2010/main" val="3583880921"/>
+      </p:ext>
+    </p:extLst>
+  </p:cSld>
+  <p:clrMapOvr>
+    <a:masterClrMapping/>
+  </p:clrMapOvr>
+</p:sld>
+</file>
+
+<file path=ppt/slides/slide13.xml><?xml version="1.0" encoding="utf-8"?>
+<p:sld xmlns:a="http://schemas.openxmlformats.org/drawingml/2006/main" xmlns:r="http://schemas.openxmlformats.org/officeDocument/2006/relationships" xmlns:p="http://schemas.openxmlformats.org/presentationml/2006/main">
+  <p:cSld>
+    <p:spTree>
+      <p:nvGrpSpPr>
+        <p:cNvPr id="1" name=""/>
+        <p:cNvGrpSpPr/>
+        <p:nvPr/>
+      </p:nvGrpSpPr>
+      <p:grpSpPr>
+        <a:xfrm>
+          <a:off x="0" y="0"/>
+          <a:ext cx="0" cy="0"/>
+          <a:chOff x="0" y="0"/>
+          <a:chExt cx="0" cy="0"/>
+        </a:xfrm>
+      </p:grpSpPr>
+      <p:pic>
+        <p:nvPicPr>
+          <p:cNvPr id="2" name="Picture 1"/>
+          <p:cNvPicPr>
+            <a:picLocks noChangeAspect="1"/>
+          </p:cNvPicPr>
+          <p:nvPr/>
+        </p:nvPicPr>
+        <p:blipFill>
+          <a:blip r:embed="rId2">
+            <a:extLst>
+              <a:ext uri="{28A0092B-C50C-407E-A947-70E740481C1C}">
+                <a14:useLocalDpi xmlns:a14="http://schemas.microsoft.com/office/drawing/2010/main" val="0"/>
+              </a:ext>
+            </a:extLst>
+          </a:blip>
+          <a:stretch>
+            <a:fillRect/>
+          </a:stretch>
+        </p:blipFill>
+        <p:spPr>
+          <a:xfrm>
+            <a:off x="73435" y="1066800"/>
+            <a:ext cx="6578825" cy="5791200"/>
+          </a:xfrm>
+          <a:prstGeom prst="rect">
+            <a:avLst/>
+          </a:prstGeom>
+        </p:spPr>
+      </p:pic>
+      <p:sp>
+        <p:nvSpPr>
+          <p:cNvPr id="60" name="TextBox 59"/>
+          <p:cNvSpPr txBox="1"/>
+          <p:nvPr/>
+        </p:nvSpPr>
+        <p:spPr>
+          <a:xfrm>
+            <a:off x="132383" y="234324"/>
+            <a:ext cx="3622787" cy="461665"/>
+          </a:xfrm>
+          <a:prstGeom prst="rect">
+            <a:avLst/>
+          </a:prstGeom>
+          <a:noFill/>
+        </p:spPr>
+        <p:txBody>
+          <a:bodyPr wrap="none" rtlCol="0">
+            <a:spAutoFit/>
+          </a:bodyPr>
+          <a:lstStyle/>
+          <a:p>
+            <a:r>
+              <a:rPr lang="de-DE" sz="2400" b="1" dirty="0" err="1" smtClean="0"/>
+              <a:t>Minicolumns</a:t>
+            </a:r>
+            <a:r>
+              <a:rPr lang="de-DE" sz="2400" b="1" dirty="0" smtClean="0"/>
+              <a:t> im Neocortex</a:t>
+            </a:r>
+            <a:endParaRPr lang="de-DE" sz="2400" b="1" dirty="0"/>
+          </a:p>
+        </p:txBody>
+      </p:sp>
+      <p:pic>
+        <p:nvPicPr>
+          <p:cNvPr id="3" name="Picture 2"/>
+          <p:cNvPicPr>
+            <a:picLocks noChangeAspect="1"/>
+          </p:cNvPicPr>
+          <p:nvPr/>
+        </p:nvPicPr>
+        <p:blipFill>
+          <a:blip r:embed="rId3">
+            <a:extLst>
+              <a:ext uri="{28A0092B-C50C-407E-A947-70E740481C1C}">
+                <a14:useLocalDpi xmlns:a14="http://schemas.microsoft.com/office/drawing/2010/main" val="0"/>
+              </a:ext>
+            </a:extLst>
+          </a:blip>
+          <a:stretch>
+            <a:fillRect/>
+          </a:stretch>
+        </p:blipFill>
+        <p:spPr>
+          <a:xfrm>
+            <a:off x="8136492" y="297180"/>
+            <a:ext cx="3331845" cy="6461760"/>
+          </a:xfrm>
+          <a:prstGeom prst="rect">
+            <a:avLst/>
+          </a:prstGeom>
+        </p:spPr>
+      </p:pic>
+      <p:cxnSp>
+        <p:nvCxnSpPr>
+          <p:cNvPr id="6" name="Straight Connector 5"/>
+          <p:cNvCxnSpPr/>
+          <p:nvPr/>
+        </p:nvCxnSpPr>
+        <p:spPr>
+          <a:xfrm flipV="1">
+            <a:off x="5318760" y="297180"/>
+            <a:ext cx="2804160" cy="1341120"/>
+          </a:xfrm>
+          <a:prstGeom prst="line">
+            <a:avLst/>
+          </a:prstGeom>
+          <a:ln w="28575">
+            <a:solidFill>
+              <a:schemeClr val="bg2">
+                <a:lumMod val="90000"/>
+              </a:schemeClr>
+            </a:solidFill>
+          </a:ln>
+        </p:spPr>
+        <p:style>
+          <a:lnRef idx="1">
+            <a:schemeClr val="accent1"/>
+          </a:lnRef>
+          <a:fillRef idx="0">
+            <a:schemeClr val="accent1"/>
+          </a:fillRef>
+          <a:effectRef idx="0">
+            <a:schemeClr val="accent1"/>
+          </a:effectRef>
+          <a:fontRef idx="minor">
+            <a:schemeClr val="tx1"/>
+          </a:fontRef>
+        </p:style>
+      </p:cxnSp>
+      <p:cxnSp>
+        <p:nvCxnSpPr>
+          <p:cNvPr id="8" name="Straight Connector 7"/>
+          <p:cNvCxnSpPr/>
+          <p:nvPr/>
+        </p:nvCxnSpPr>
+        <p:spPr>
+          <a:xfrm>
+            <a:off x="5303520" y="2689860"/>
+            <a:ext cx="2832972" cy="251460"/>
+          </a:xfrm>
+          <a:prstGeom prst="line">
+            <a:avLst/>
+          </a:prstGeom>
+          <a:ln w="28575">
+            <a:solidFill>
+              <a:schemeClr val="bg2">
+                <a:lumMod val="90000"/>
+              </a:schemeClr>
+            </a:solidFill>
+          </a:ln>
+        </p:spPr>
+        <p:style>
+          <a:lnRef idx="1">
+            <a:schemeClr val="accent1"/>
+          </a:lnRef>
+          <a:fillRef idx="0">
+            <a:schemeClr val="accent1"/>
+          </a:fillRef>
+          <a:effectRef idx="0">
+            <a:schemeClr val="accent1"/>
+          </a:effectRef>
+          <a:fontRef idx="minor">
+            <a:schemeClr val="tx1"/>
+          </a:fontRef>
+        </p:style>
+      </p:cxnSp>
+    </p:spTree>
+    <p:extLst>
+      <p:ext uri="{BB962C8B-B14F-4D97-AF65-F5344CB8AC3E}">
+        <p14:creationId xmlns:p14="http://schemas.microsoft.com/office/powerpoint/2010/main" val="2485494864"/>
+      </p:ext>
+    </p:extLst>
+  </p:cSld>
+  <p:clrMapOvr>
+    <a:masterClrMapping/>
+  </p:clrMapOvr>
+</p:sld>
+</file>
+
+<file path=ppt/slides/slide14.xml><?xml version="1.0" encoding="utf-8"?>
+<p:sld xmlns:a="http://schemas.openxmlformats.org/drawingml/2006/main" xmlns:r="http://schemas.openxmlformats.org/officeDocument/2006/relationships" xmlns:p="http://schemas.openxmlformats.org/presentationml/2006/main">
+  <p:cSld>
+    <p:spTree>
+      <p:nvGrpSpPr>
+        <p:cNvPr id="1" name=""/>
+        <p:cNvGrpSpPr/>
+        <p:nvPr/>
+      </p:nvGrpSpPr>
+      <p:grpSpPr>
+        <a:xfrm>
+          <a:off x="0" y="0"/>
+          <a:ext cx="0" cy="0"/>
+          <a:chOff x="0" y="0"/>
+          <a:chExt cx="0" cy="0"/>
+        </a:xfrm>
+      </p:grpSpPr>
+      <p:pic>
+        <p:nvPicPr>
+          <p:cNvPr id="3" name="Picture 2"/>
+          <p:cNvPicPr>
+            <a:picLocks noChangeAspect="1"/>
+          </p:cNvPicPr>
+          <p:nvPr/>
+        </p:nvPicPr>
+        <p:blipFill>
+          <a:blip r:embed="rId2">
+            <a:extLst>
+              <a:ext uri="{28A0092B-C50C-407E-A947-70E740481C1C}">
+                <a14:useLocalDpi xmlns:a14="http://schemas.microsoft.com/office/drawing/2010/main" val="0"/>
+              </a:ext>
+            </a:extLst>
+          </a:blip>
+          <a:stretch>
+            <a:fillRect/>
+          </a:stretch>
+        </p:blipFill>
+        <p:spPr>
+          <a:xfrm>
+            <a:off x="219312" y="234324"/>
+            <a:ext cx="3331845" cy="6461760"/>
+          </a:xfrm>
+          <a:prstGeom prst="rect">
+            <a:avLst/>
+          </a:prstGeom>
+        </p:spPr>
+      </p:pic>
+      <p:sp>
+        <p:nvSpPr>
+          <p:cNvPr id="60" name="TextBox 59"/>
+          <p:cNvSpPr txBox="1"/>
+          <p:nvPr/>
+        </p:nvSpPr>
+        <p:spPr>
+          <a:xfrm>
+            <a:off x="9558323" y="234324"/>
+            <a:ext cx="2505238" cy="461665"/>
+          </a:xfrm>
+          <a:prstGeom prst="rect">
+            <a:avLst/>
+          </a:prstGeom>
+          <a:noFill/>
+        </p:spPr>
+        <p:txBody>
+          <a:bodyPr wrap="none" rtlCol="0">
+            <a:spAutoFit/>
+          </a:bodyPr>
+          <a:lstStyle/>
+          <a:p>
+            <a:r>
+              <a:rPr lang="de-DE" sz="2400" b="1" dirty="0" err="1" smtClean="0"/>
+              <a:t>Neuronenmodelle</a:t>
+            </a:r>
+            <a:endParaRPr lang="de-DE" sz="2400" b="1" dirty="0"/>
+          </a:p>
+        </p:txBody>
+      </p:sp>
+      <p:cxnSp>
+        <p:nvCxnSpPr>
+          <p:cNvPr id="8" name="Straight Connector 7"/>
+          <p:cNvCxnSpPr/>
+          <p:nvPr/>
+        </p:nvCxnSpPr>
+        <p:spPr>
+          <a:xfrm>
+            <a:off x="5303520" y="2689860"/>
+            <a:ext cx="2832972" cy="251460"/>
+          </a:xfrm>
+          <a:prstGeom prst="line">
+            <a:avLst/>
+          </a:prstGeom>
+          <a:ln w="28575">
+            <a:solidFill>
+              <a:schemeClr val="bg2">
+                <a:lumMod val="90000"/>
+              </a:schemeClr>
+            </a:solidFill>
+          </a:ln>
+        </p:spPr>
+        <p:style>
+          <a:lnRef idx="1">
+            <a:schemeClr val="accent1"/>
+          </a:lnRef>
+          <a:fillRef idx="0">
+            <a:schemeClr val="accent1"/>
+          </a:fillRef>
+          <a:effectRef idx="0">
+            <a:schemeClr val="accent1"/>
+          </a:effectRef>
+          <a:fontRef idx="minor">
+            <a:schemeClr val="tx1"/>
+          </a:fontRef>
+        </p:style>
+      </p:cxnSp>
+      <p:pic>
+        <p:nvPicPr>
+          <p:cNvPr id="4" name="Picture 3"/>
+          <p:cNvPicPr>
+            <a:picLocks noChangeAspect="1"/>
+          </p:cNvPicPr>
+          <p:nvPr/>
+        </p:nvPicPr>
+        <p:blipFill>
+          <a:blip r:embed="rId3">
+            <a:extLst>
+              <a:ext uri="{28A0092B-C50C-407E-A947-70E740481C1C}">
+                <a14:useLocalDpi xmlns:a14="http://schemas.microsoft.com/office/drawing/2010/main" val="0"/>
+              </a:ext>
+            </a:extLst>
+          </a:blip>
+          <a:stretch>
+            <a:fillRect/>
+          </a:stretch>
+        </p:blipFill>
+        <p:spPr>
+          <a:xfrm>
+            <a:off x="5158740" y="848359"/>
+            <a:ext cx="6667500" cy="5580727"/>
+          </a:xfrm>
+          <a:prstGeom prst="rect">
+            <a:avLst/>
+          </a:prstGeom>
+        </p:spPr>
+      </p:pic>
+      <p:cxnSp>
+        <p:nvCxnSpPr>
+          <p:cNvPr id="6" name="Straight Connector 5"/>
+          <p:cNvCxnSpPr/>
+          <p:nvPr/>
+        </p:nvCxnSpPr>
+        <p:spPr>
+          <a:xfrm flipV="1">
+            <a:off x="3360420" y="4648200"/>
+            <a:ext cx="2689860" cy="205740"/>
+          </a:xfrm>
+          <a:prstGeom prst="line">
+            <a:avLst/>
+          </a:prstGeom>
+          <a:ln w="28575">
+            <a:solidFill>
+              <a:schemeClr val="bg2">
+                <a:lumMod val="90000"/>
+              </a:schemeClr>
+            </a:solidFill>
+          </a:ln>
+        </p:spPr>
+        <p:style>
+          <a:lnRef idx="1">
+            <a:schemeClr val="accent1"/>
+          </a:lnRef>
+          <a:fillRef idx="0">
+            <a:schemeClr val="accent1"/>
+          </a:fillRef>
+          <a:effectRef idx="0">
+            <a:schemeClr val="accent1"/>
+          </a:effectRef>
+          <a:fontRef idx="minor">
+            <a:schemeClr val="tx1"/>
+          </a:fontRef>
+        </p:style>
+      </p:cxnSp>
+      <p:cxnSp>
+        <p:nvCxnSpPr>
+          <p:cNvPr id="9" name="Straight Connector 8"/>
+          <p:cNvCxnSpPr/>
+          <p:nvPr/>
+        </p:nvCxnSpPr>
+        <p:spPr>
+          <a:xfrm>
+            <a:off x="3360420" y="4983480"/>
+            <a:ext cx="2545080" cy="198120"/>
+          </a:xfrm>
+          <a:prstGeom prst="line">
+            <a:avLst/>
+          </a:prstGeom>
+          <a:ln w="28575">
+            <a:solidFill>
+              <a:schemeClr val="bg2">
+                <a:lumMod val="90000"/>
+              </a:schemeClr>
+            </a:solidFill>
+          </a:ln>
+        </p:spPr>
+        <p:style>
+          <a:lnRef idx="1">
+            <a:schemeClr val="accent1"/>
+          </a:lnRef>
+          <a:fillRef idx="0">
+            <a:schemeClr val="accent1"/>
+          </a:fillRef>
+          <a:effectRef idx="0">
+            <a:schemeClr val="accent1"/>
+          </a:effectRef>
+          <a:fontRef idx="minor">
+            <a:schemeClr val="tx1"/>
+          </a:fontRef>
+        </p:style>
+      </p:cxnSp>
+      <p:sp>
+        <p:nvSpPr>
+          <p:cNvPr id="14" name="TextBox 13"/>
+          <p:cNvSpPr txBox="1"/>
+          <p:nvPr/>
+        </p:nvSpPr>
+        <p:spPr>
+          <a:xfrm>
+            <a:off x="9602919" y="695989"/>
+            <a:ext cx="2416046" cy="369332"/>
+          </a:xfrm>
+          <a:prstGeom prst="rect">
+            <a:avLst/>
+          </a:prstGeom>
+          <a:noFill/>
+        </p:spPr>
+        <p:txBody>
+          <a:bodyPr wrap="none" rtlCol="0">
+            <a:spAutoFit/>
+          </a:bodyPr>
+          <a:lstStyle/>
+          <a:p>
+            <a:r>
+              <a:rPr lang="de-DE" dirty="0" smtClean="0"/>
+              <a:t>Hawkins, Ahmad (2016)</a:t>
+            </a:r>
+            <a:endParaRPr lang="de-DE" dirty="0"/>
+          </a:p>
+        </p:txBody>
+      </p:sp>
+    </p:spTree>
+    <p:extLst>
+      <p:ext uri="{BB962C8B-B14F-4D97-AF65-F5344CB8AC3E}">
+        <p14:creationId xmlns:p14="http://schemas.microsoft.com/office/powerpoint/2010/main" val="2808089985"/>
+      </p:ext>
+    </p:extLst>
+  </p:cSld>
+  <p:clrMapOvr>
+    <a:masterClrMapping/>
+  </p:clrMapOvr>
+</p:sld>
+</file>
+
+<file path=ppt/slides/slide15.xml><?xml version="1.0" encoding="utf-8"?>
+<p:sld xmlns:a="http://schemas.openxmlformats.org/drawingml/2006/main" xmlns:r="http://schemas.openxmlformats.org/officeDocument/2006/relationships" xmlns:p="http://schemas.openxmlformats.org/presentationml/2006/main">
+  <p:cSld>
+    <p:spTree>
+      <p:nvGrpSpPr>
+        <p:cNvPr id="1" name=""/>
+        <p:cNvGrpSpPr/>
+        <p:nvPr/>
+      </p:nvGrpSpPr>
+      <p:grpSpPr>
+        <a:xfrm>
+          <a:off x="0" y="0"/>
+          <a:ext cx="0" cy="0"/>
+          <a:chOff x="0" y="0"/>
+          <a:chExt cx="0" cy="0"/>
+        </a:xfrm>
+      </p:grpSpPr>
+    </p:spTree>
+    <p:extLst>
+      <p:ext uri="{BB962C8B-B14F-4D97-AF65-F5344CB8AC3E}">
+        <p14:creationId xmlns:p14="http://schemas.microsoft.com/office/powerpoint/2010/main" val="2078687425"/>
+      </p:ext>
+    </p:extLst>
+  </p:cSld>
+  <p:clrMapOvr>
+    <a:masterClrMapping/>
+  </p:clrMapOvr>
+</p:sld>
+</file>
+
+<file path=ppt/slides/slide16.xml><?xml version="1.0" encoding="utf-8"?>
+<p:sld xmlns:a="http://schemas.openxmlformats.org/drawingml/2006/main" xmlns:r="http://schemas.openxmlformats.org/officeDocument/2006/relationships" xmlns:p="http://schemas.openxmlformats.org/presentationml/2006/main">
+  <p:cSld>
+    <p:spTree>
+      <p:nvGrpSpPr>
+        <p:cNvPr id="1" name=""/>
+        <p:cNvGrpSpPr/>
+        <p:nvPr/>
+      </p:nvGrpSpPr>
+      <p:grpSpPr>
+        <a:xfrm>
+          <a:off x="0" y="0"/>
+          <a:ext cx="0" cy="0"/>
+          <a:chOff x="0" y="0"/>
+          <a:chExt cx="0" cy="0"/>
+        </a:xfrm>
+      </p:grpSpPr>
+      <p:sp>
+        <p:nvSpPr>
+          <p:cNvPr id="3" name="Content Placeholder 2"/>
+          <p:cNvSpPr>
+            <a:spLocks noGrp="1"/>
+          </p:cNvSpPr>
+          <p:nvPr>
+            <p:ph idx="1"/>
+          </p:nvPr>
+        </p:nvSpPr>
+        <p:spPr>
+          <a:xfrm>
+            <a:off x="838200" y="450376"/>
+            <a:ext cx="10515600" cy="5726587"/>
+          </a:xfrm>
+        </p:spPr>
+        <p:txBody>
+          <a:bodyPr/>
+          <a:lstStyle/>
+          <a:p>
+            <a:pPr marL="0" indent="0">
+              <a:buNone/>
+            </a:pPr>
+            <a:r>
+              <a:rPr lang="de-DE" dirty="0" smtClean="0"/>
+              <a:t>Quellen:</a:t>
+            </a:r>
+          </a:p>
+          <a:p>
+            <a:pPr marL="0" indent="0">
+              <a:buNone/>
+            </a:pPr>
+            <a:endParaRPr lang="de-DE" dirty="0"/>
+          </a:p>
+          <a:p>
+            <a:pPr marL="0" indent="0">
+              <a:buNone/>
+            </a:pPr>
+            <a:endParaRPr lang="de-DE" dirty="0" smtClean="0"/>
+          </a:p>
+          <a:p>
+            <a:pPr marL="0" indent="0">
+              <a:buNone/>
+            </a:pPr>
+            <a:r>
+              <a:rPr lang="de-DE" dirty="0" smtClean="0"/>
+              <a:t>Weiterführende Informationen:</a:t>
+            </a:r>
+            <a:endParaRPr lang="de-DE" dirty="0"/>
+          </a:p>
+        </p:txBody>
+      </p:sp>
+    </p:spTree>
+    <p:extLst>
+      <p:ext uri="{BB962C8B-B14F-4D97-AF65-F5344CB8AC3E}">
+        <p14:creationId xmlns:p14="http://schemas.microsoft.com/office/powerpoint/2010/main" val="944380725"/>
       </p:ext>
     </p:extLst>
   </p:cSld>
@@ -3088,39 +4891,102 @@
           <a:chExt cx="0" cy="0"/>
         </a:xfrm>
       </p:grpSpPr>
-      <p:pic>
-        <p:nvPicPr>
-          <p:cNvPr id="4" name="Content Placeholder 3"/>
-          <p:cNvPicPr>
-            <a:picLocks noGrp="1" noChangeAspect="1"/>
-          </p:cNvPicPr>
+      <p:sp>
+        <p:nvSpPr>
+          <p:cNvPr id="2" name="Title 1"/>
+          <p:cNvSpPr>
+            <a:spLocks noGrp="1"/>
+          </p:cNvSpPr>
+          <p:nvPr>
+            <p:ph type="title"/>
+          </p:nvPr>
+        </p:nvSpPr>
+        <p:spPr/>
+        <p:txBody>
+          <a:bodyPr/>
+          <a:lstStyle/>
+          <a:p>
+            <a:r>
+              <a:rPr lang="de-DE" dirty="0" smtClean="0"/>
+              <a:t>Agenten und Simulation von AL</a:t>
+            </a:r>
+            <a:endParaRPr lang="de-DE" dirty="0"/>
+          </a:p>
+        </p:txBody>
+      </p:sp>
+      <p:sp>
+        <p:nvSpPr>
+          <p:cNvPr id="3" name="Content Placeholder 2"/>
+          <p:cNvSpPr>
+            <a:spLocks noGrp="1"/>
+          </p:cNvSpPr>
           <p:nvPr>
             <p:ph idx="1"/>
           </p:nvPr>
-        </p:nvPicPr>
-        <p:blipFill>
-          <a:blip r:embed="rId2">
-            <a:extLst>
-              <a:ext uri="{28A0092B-C50C-407E-A947-70E740481C1C}">
-                <a14:useLocalDpi xmlns:a14="http://schemas.microsoft.com/office/drawing/2010/main" val="0"/>
-              </a:ext>
-            </a:extLst>
-          </a:blip>
-          <a:stretch>
-            <a:fillRect/>
-          </a:stretch>
-        </p:blipFill>
-        <p:spPr>
-          <a:xfrm>
-            <a:off x="2579428" y="568729"/>
-            <a:ext cx="6298282" cy="5710591"/>
-          </a:xfrm>
-        </p:spPr>
-      </p:pic>
+        </p:nvSpPr>
+        <p:spPr/>
+        <p:txBody>
+          <a:bodyPr/>
+          <a:lstStyle/>
+          <a:p>
+            <a:pPr>
+              <a:buFont typeface="Wingdings" panose="05000000000000000000" pitchFamily="2" charset="2"/>
+              <a:buChar char="§"/>
+            </a:pPr>
+            <a:r>
+              <a:rPr lang="de-DE" dirty="0" smtClean="0"/>
+              <a:t>Exkurs: </a:t>
+            </a:r>
+            <a:r>
+              <a:rPr lang="de-DE" dirty="0" err="1" smtClean="0"/>
+              <a:t>Hierarchical</a:t>
+            </a:r>
+            <a:r>
+              <a:rPr lang="de-DE" dirty="0" smtClean="0"/>
+              <a:t> Temporal Memory</a:t>
+            </a:r>
+          </a:p>
+          <a:p>
+            <a:pPr>
+              <a:buFont typeface="Wingdings" panose="05000000000000000000" pitchFamily="2" charset="2"/>
+              <a:buChar char="§"/>
+            </a:pPr>
+            <a:r>
+              <a:rPr lang="de-DE" dirty="0" smtClean="0"/>
+              <a:t>Simulation </a:t>
+            </a:r>
+            <a:r>
+              <a:rPr lang="de-DE" dirty="0" smtClean="0"/>
+              <a:t>von Anwendungslandschaften</a:t>
+            </a:r>
+          </a:p>
+          <a:p>
+            <a:pPr>
+              <a:buFont typeface="Wingdings" panose="05000000000000000000" pitchFamily="2" charset="2"/>
+              <a:buChar char="§"/>
+            </a:pPr>
+            <a:r>
+              <a:rPr lang="de-DE" dirty="0" smtClean="0"/>
+              <a:t>Problem Statement</a:t>
+            </a:r>
+          </a:p>
+          <a:p>
+            <a:pPr>
+              <a:buFont typeface="Wingdings" panose="05000000000000000000" pitchFamily="2" charset="2"/>
+              <a:buChar char="§"/>
+            </a:pPr>
+            <a:r>
+              <a:rPr lang="de-DE" dirty="0" smtClean="0"/>
+              <a:t>Roadmap</a:t>
+            </a:r>
+            <a:endParaRPr lang="de-DE" dirty="0"/>
+          </a:p>
+        </p:txBody>
+      </p:sp>
     </p:spTree>
     <p:extLst>
       <p:ext uri="{BB962C8B-B14F-4D97-AF65-F5344CB8AC3E}">
-        <p14:creationId xmlns:p14="http://schemas.microsoft.com/office/powerpoint/2010/main" val="3477420538"/>
+        <p14:creationId xmlns:p14="http://schemas.microsoft.com/office/powerpoint/2010/main" val="2839277671"/>
       </p:ext>
     </p:extLst>
   </p:cSld>
@@ -3171,15 +5037,15 @@
         </p:blipFill>
         <p:spPr>
           <a:xfrm>
-            <a:off x="2531659" y="545910"/>
-            <a:ext cx="6869283" cy="5617405"/>
+            <a:off x="2579428" y="568729"/>
+            <a:ext cx="6298282" cy="5710591"/>
           </a:xfrm>
         </p:spPr>
       </p:pic>
     </p:spTree>
     <p:extLst>
       <p:ext uri="{BB962C8B-B14F-4D97-AF65-F5344CB8AC3E}">
-        <p14:creationId xmlns:p14="http://schemas.microsoft.com/office/powerpoint/2010/main" val="928893189"/>
+        <p14:creationId xmlns:p14="http://schemas.microsoft.com/office/powerpoint/2010/main" val="3477420538"/>
       </p:ext>
     </p:extLst>
   </p:cSld>
@@ -3235,130 +5101,10 @@
           </a:xfrm>
         </p:spPr>
       </p:pic>
-      <p:sp>
-        <p:nvSpPr>
-          <p:cNvPr id="5" name="Oval 4"/>
-          <p:cNvSpPr/>
-          <p:nvPr/>
-        </p:nvSpPr>
-        <p:spPr>
-          <a:xfrm>
-            <a:off x="4858603" y="2433389"/>
-            <a:ext cx="2661314" cy="2780056"/>
-          </a:xfrm>
-          <a:prstGeom prst="ellipse">
-            <a:avLst/>
-          </a:prstGeom>
-          <a:noFill/>
-          <a:ln w="57150">
-            <a:solidFill>
-              <a:srgbClr val="C00000"/>
-            </a:solidFill>
-          </a:ln>
-        </p:spPr>
-        <p:style>
-          <a:lnRef idx="2">
-            <a:schemeClr val="accent1">
-              <a:shade val="50000"/>
-            </a:schemeClr>
-          </a:lnRef>
-          <a:fillRef idx="1">
-            <a:schemeClr val="accent1"/>
-          </a:fillRef>
-          <a:effectRef idx="0">
-            <a:schemeClr val="accent1"/>
-          </a:effectRef>
-          <a:fontRef idx="minor">
-            <a:schemeClr val="lt1"/>
-          </a:fontRef>
-        </p:style>
-        <p:txBody>
-          <a:bodyPr rtlCol="0" anchor="ctr"/>
-          <a:lstStyle/>
-          <a:p>
-            <a:pPr algn="ctr"/>
-            <a:endParaRPr lang="de-DE"/>
-          </a:p>
-        </p:txBody>
-      </p:sp>
-      <p:cxnSp>
-        <p:nvCxnSpPr>
-          <p:cNvPr id="7" name="Straight Arrow Connector 6"/>
-          <p:cNvCxnSpPr/>
-          <p:nvPr/>
-        </p:nvCxnSpPr>
-        <p:spPr>
-          <a:xfrm flipH="1" flipV="1">
-            <a:off x="7192370" y="3882788"/>
-            <a:ext cx="2613546" cy="382137"/>
-          </a:xfrm>
-          <a:prstGeom prst="straightConnector1">
-            <a:avLst/>
-          </a:prstGeom>
-          <a:ln w="57150">
-            <a:solidFill>
-              <a:srgbClr val="C00000"/>
-            </a:solidFill>
-            <a:tailEnd type="triangle"/>
-          </a:ln>
-        </p:spPr>
-        <p:style>
-          <a:lnRef idx="1">
-            <a:schemeClr val="accent1"/>
-          </a:lnRef>
-          <a:fillRef idx="0">
-            <a:schemeClr val="accent1"/>
-          </a:fillRef>
-          <a:effectRef idx="0">
-            <a:schemeClr val="accent1"/>
-          </a:effectRef>
-          <a:fontRef idx="minor">
-            <a:schemeClr val="tx1"/>
-          </a:fontRef>
-        </p:style>
-      </p:cxnSp>
-      <p:sp>
-        <p:nvSpPr>
-          <p:cNvPr id="8" name="TextBox 7"/>
-          <p:cNvSpPr txBox="1"/>
-          <p:nvPr/>
-        </p:nvSpPr>
-        <p:spPr>
-          <a:xfrm>
-            <a:off x="9805916" y="4264925"/>
-            <a:ext cx="1908984" cy="523220"/>
-          </a:xfrm>
-          <a:prstGeom prst="rect">
-            <a:avLst/>
-          </a:prstGeom>
-          <a:noFill/>
-        </p:spPr>
-        <p:txBody>
-          <a:bodyPr wrap="none" rtlCol="0">
-            <a:spAutoFit/>
-          </a:bodyPr>
-          <a:lstStyle/>
-          <a:p>
-            <a:r>
-              <a:rPr lang="de-DE" sz="2800" b="1" dirty="0" smtClean="0">
-                <a:solidFill>
-                  <a:srgbClr val="C00000"/>
-                </a:solidFill>
-              </a:rPr>
-              <a:t>„Alle“ Tiere</a:t>
-            </a:r>
-            <a:endParaRPr lang="de-DE" sz="2800" b="1" dirty="0">
-              <a:solidFill>
-                <a:srgbClr val="C00000"/>
-              </a:solidFill>
-            </a:endParaRPr>
-          </a:p>
-        </p:txBody>
-      </p:sp>
     </p:spTree>
     <p:extLst>
       <p:ext uri="{BB962C8B-B14F-4D97-AF65-F5344CB8AC3E}">
-        <p14:creationId xmlns:p14="http://schemas.microsoft.com/office/powerpoint/2010/main" val="3484164410"/>
+        <p14:creationId xmlns:p14="http://schemas.microsoft.com/office/powerpoint/2010/main" val="928893189"/>
       </p:ext>
     </p:extLst>
   </p:cSld>
@@ -3534,133 +5280,10 @@
           </a:p>
         </p:txBody>
       </p:sp>
-      <p:sp>
-        <p:nvSpPr>
-          <p:cNvPr id="9" name="Oval 8"/>
-          <p:cNvSpPr/>
-          <p:nvPr/>
-        </p:nvSpPr>
-        <p:spPr>
-          <a:xfrm>
-            <a:off x="3719014" y="1610436"/>
-            <a:ext cx="4728949" cy="3755409"/>
-          </a:xfrm>
-          <a:prstGeom prst="ellipse">
-            <a:avLst/>
-          </a:prstGeom>
-          <a:noFill/>
-          <a:ln w="57150">
-            <a:solidFill>
-              <a:srgbClr val="002060"/>
-            </a:solidFill>
-          </a:ln>
-        </p:spPr>
-        <p:style>
-          <a:lnRef idx="2">
-            <a:schemeClr val="accent1">
-              <a:shade val="50000"/>
-            </a:schemeClr>
-          </a:lnRef>
-          <a:fillRef idx="1">
-            <a:schemeClr val="accent1"/>
-          </a:fillRef>
-          <a:effectRef idx="0">
-            <a:schemeClr val="accent1"/>
-          </a:effectRef>
-          <a:fontRef idx="minor">
-            <a:schemeClr val="lt1"/>
-          </a:fontRef>
-        </p:style>
-        <p:txBody>
-          <a:bodyPr rtlCol="0" anchor="ctr"/>
-          <a:lstStyle/>
-          <a:p>
-            <a:pPr algn="ctr"/>
-            <a:endParaRPr lang="de-DE"/>
-          </a:p>
-        </p:txBody>
-      </p:sp>
-      <p:cxnSp>
-        <p:nvCxnSpPr>
-          <p:cNvPr id="10" name="Straight Arrow Connector 9"/>
-          <p:cNvCxnSpPr/>
-          <p:nvPr/>
-        </p:nvCxnSpPr>
-        <p:spPr>
-          <a:xfrm>
-            <a:off x="2709081" y="1610436"/>
-            <a:ext cx="1944806" cy="822953"/>
-          </a:xfrm>
-          <a:prstGeom prst="straightConnector1">
-            <a:avLst/>
-          </a:prstGeom>
-          <a:ln w="57150">
-            <a:solidFill>
-              <a:srgbClr val="002060"/>
-            </a:solidFill>
-            <a:tailEnd type="triangle"/>
-          </a:ln>
-        </p:spPr>
-        <p:style>
-          <a:lnRef idx="1">
-            <a:schemeClr val="accent1"/>
-          </a:lnRef>
-          <a:fillRef idx="0">
-            <a:schemeClr val="accent1"/>
-          </a:fillRef>
-          <a:effectRef idx="0">
-            <a:schemeClr val="accent1"/>
-          </a:effectRef>
-          <a:fontRef idx="minor">
-            <a:schemeClr val="tx1"/>
-          </a:fontRef>
-        </p:style>
-      </p:cxnSp>
-      <p:sp>
-        <p:nvSpPr>
-          <p:cNvPr id="13" name="TextBox 12"/>
-          <p:cNvSpPr txBox="1"/>
-          <p:nvPr/>
-        </p:nvSpPr>
-        <p:spPr>
-          <a:xfrm>
-            <a:off x="851039" y="1087216"/>
-            <a:ext cx="1769331" cy="523220"/>
-          </a:xfrm>
-          <a:prstGeom prst="rect">
-            <a:avLst/>
-          </a:prstGeom>
-          <a:noFill/>
-          <a:ln>
-            <a:noFill/>
-          </a:ln>
-        </p:spPr>
-        <p:txBody>
-          <a:bodyPr wrap="none" rtlCol="0">
-            <a:spAutoFit/>
-          </a:bodyPr>
-          <a:lstStyle/>
-          <a:p>
-            <a:r>
-              <a:rPr lang="de-DE" sz="2800" b="1" dirty="0" smtClean="0">
-                <a:solidFill>
-                  <a:srgbClr val="002060"/>
-                </a:solidFill>
-              </a:rPr>
-              <a:t>Säugetiere</a:t>
-            </a:r>
-            <a:endParaRPr lang="de-DE" sz="2800" b="1" dirty="0">
-              <a:solidFill>
-                <a:srgbClr val="002060"/>
-              </a:solidFill>
-            </a:endParaRPr>
-          </a:p>
-        </p:txBody>
-      </p:sp>
     </p:spTree>
     <p:extLst>
       <p:ext uri="{BB962C8B-B14F-4D97-AF65-F5344CB8AC3E}">
-        <p14:creationId xmlns:p14="http://schemas.microsoft.com/office/powerpoint/2010/main" val="4050214015"/>
+        <p14:creationId xmlns:p14="http://schemas.microsoft.com/office/powerpoint/2010/main" val="3484164410"/>
       </p:ext>
     </p:extLst>
   </p:cSld>
@@ -3687,22 +5310,55 @@
           <a:chExt cx="0" cy="0"/>
         </a:xfrm>
       </p:grpSpPr>
-      <p:sp>
-        <p:nvSpPr>
-          <p:cNvPr id="5" name="Rectangle 4"/>
+      <p:pic>
+        <p:nvPicPr>
+          <p:cNvPr id="4" name="Content Placeholder 3"/>
+          <p:cNvPicPr>
+            <a:picLocks noGrp="1" noChangeAspect="1"/>
+          </p:cNvPicPr>
+          <p:nvPr>
+            <p:ph idx="1"/>
+          </p:nvPr>
+        </p:nvPicPr>
+        <p:blipFill>
+          <a:blip r:embed="rId2">
+            <a:extLst>
+              <a:ext uri="{28A0092B-C50C-407E-A947-70E740481C1C}">
+                <a14:useLocalDpi xmlns:a14="http://schemas.microsoft.com/office/drawing/2010/main" val="0"/>
+              </a:ext>
+            </a:extLst>
+          </a:blip>
+          <a:stretch>
+            <a:fillRect/>
+          </a:stretch>
+        </p:blipFill>
+        <p:spPr>
+          <a:xfrm>
+            <a:off x="2531659" y="545910"/>
+            <a:ext cx="6869283" cy="5617405"/>
+          </a:xfrm>
+        </p:spPr>
+      </p:pic>
+      <p:sp>
+        <p:nvSpPr>
+          <p:cNvPr id="5" name="Oval 4"/>
           <p:cNvSpPr/>
           <p:nvPr/>
         </p:nvSpPr>
         <p:spPr>
           <a:xfrm>
-            <a:off x="968991" y="1599062"/>
-            <a:ext cx="2715904" cy="1105469"/>
-          </a:xfrm>
-          <a:prstGeom prst="rect">
+            <a:off x="4858603" y="2433389"/>
+            <a:ext cx="2661314" cy="2780056"/>
+          </a:xfrm>
+          <a:prstGeom prst="ellipse">
             <a:avLst/>
           </a:prstGeom>
           <a:noFill/>
-          <a:ln w="57150"/>
+          <a:ln w="57150">
+            <a:solidFill>
+              <a:srgbClr val="C00000"/>
+            </a:solidFill>
+          </a:ln>
         </p:spPr>
         <p:style>
           <a:lnRef idx="2">
@@ -3725,17 +5381,79 @@
           <a:lstStyle/>
           <a:p>
             <a:pPr algn="ctr"/>
-            <a:r>
-              <a:rPr lang="de-DE" sz="2400" dirty="0" smtClean="0">
+            <a:endParaRPr lang="de-DE"/>
+          </a:p>
+        </p:txBody>
+      </p:sp>
+      <p:cxnSp>
+        <p:nvCxnSpPr>
+          <p:cNvPr id="7" name="Straight Arrow Connector 6"/>
+          <p:cNvCxnSpPr/>
+          <p:nvPr/>
+        </p:nvCxnSpPr>
+        <p:spPr>
+          <a:xfrm flipH="1" flipV="1">
+            <a:off x="7192370" y="3882788"/>
+            <a:ext cx="2613546" cy="382137"/>
+          </a:xfrm>
+          <a:prstGeom prst="straightConnector1">
+            <a:avLst/>
+          </a:prstGeom>
+          <a:ln w="57150">
+            <a:solidFill>
+              <a:srgbClr val="C00000"/>
+            </a:solidFill>
+            <a:tailEnd type="triangle"/>
+          </a:ln>
+        </p:spPr>
+        <p:style>
+          <a:lnRef idx="1">
+            <a:schemeClr val="accent1"/>
+          </a:lnRef>
+          <a:fillRef idx="0">
+            <a:schemeClr val="accent1"/>
+          </a:fillRef>
+          <a:effectRef idx="0">
+            <a:schemeClr val="accent1"/>
+          </a:effectRef>
+          <a:fontRef idx="minor">
+            <a:schemeClr val="tx1"/>
+          </a:fontRef>
+        </p:style>
+      </p:cxnSp>
+      <p:sp>
+        <p:nvSpPr>
+          <p:cNvPr id="8" name="TextBox 7"/>
+          <p:cNvSpPr txBox="1"/>
+          <p:nvPr/>
+        </p:nvSpPr>
+        <p:spPr>
+          <a:xfrm>
+            <a:off x="9805916" y="4264925"/>
+            <a:ext cx="1908984" cy="523220"/>
+          </a:xfrm>
+          <a:prstGeom prst="rect">
+            <a:avLst/>
+          </a:prstGeom>
+          <a:noFill/>
+        </p:spPr>
+        <p:txBody>
+          <a:bodyPr wrap="none" rtlCol="0">
+            <a:spAutoFit/>
+          </a:bodyPr>
+          <a:lstStyle/>
+          <a:p>
+            <a:r>
+              <a:rPr lang="de-DE" sz="2800" b="1" dirty="0" smtClean="0">
                 <a:solidFill>
-                  <a:schemeClr val="tx1"/>
+                  <a:srgbClr val="C00000"/>
                 </a:solidFill>
               </a:rPr>
-              <a:t>Hippocampus</a:t>
-            </a:r>
-            <a:endParaRPr lang="de-DE" sz="2400" dirty="0">
+              <a:t>„Alle“ Tiere</a:t>
+            </a:r>
+            <a:endParaRPr lang="de-DE" sz="2800" b="1" dirty="0">
               <a:solidFill>
-                <a:schemeClr val="tx1"/>
+                <a:srgbClr val="C00000"/>
               </a:solidFill>
             </a:endParaRPr>
           </a:p>
@@ -3743,20 +5461,24 @@
       </p:sp>
       <p:sp>
         <p:nvSpPr>
-          <p:cNvPr id="6" name="Rectangle 5"/>
+          <p:cNvPr id="9" name="Oval 8"/>
           <p:cNvSpPr/>
           <p:nvPr/>
         </p:nvSpPr>
         <p:spPr>
           <a:xfrm>
-            <a:off x="968991" y="3234519"/>
-            <a:ext cx="2715904" cy="1105469"/>
-          </a:xfrm>
-          <a:prstGeom prst="rect">
+            <a:off x="3719014" y="1610436"/>
+            <a:ext cx="4728949" cy="3755409"/>
+          </a:xfrm>
+          <a:prstGeom prst="ellipse">
             <a:avLst/>
           </a:prstGeom>
           <a:noFill/>
-          <a:ln w="57150"/>
+          <a:ln w="57150">
+            <a:solidFill>
+              <a:srgbClr val="002060"/>
+            </a:solidFill>
+          </a:ln>
         </p:spPr>
         <p:style>
           <a:lnRef idx="2">
@@ -3779,91 +5501,28 @@
           <a:lstStyle/>
           <a:p>
             <a:pPr algn="ctr"/>
-            <a:r>
-              <a:rPr lang="de-DE" sz="2400" dirty="0" smtClean="0">
-                <a:solidFill>
-                  <a:schemeClr val="tx1"/>
-                </a:solidFill>
-              </a:rPr>
-              <a:t>Thalamus</a:t>
-            </a:r>
-            <a:endParaRPr lang="de-DE" dirty="0">
-              <a:solidFill>
-                <a:schemeClr val="tx1"/>
-              </a:solidFill>
-            </a:endParaRPr>
-          </a:p>
-        </p:txBody>
-      </p:sp>
-      <p:sp>
-        <p:nvSpPr>
-          <p:cNvPr id="7" name="Rectangle 6"/>
-          <p:cNvSpPr/>
-          <p:nvPr/>
-        </p:nvSpPr>
-        <p:spPr>
-          <a:xfrm>
-            <a:off x="5898108" y="893928"/>
-            <a:ext cx="5333999" cy="4535607"/>
-          </a:xfrm>
-          <a:prstGeom prst="rect">
-            <a:avLst/>
-          </a:prstGeom>
-          <a:noFill/>
-          <a:ln w="57150"/>
-        </p:spPr>
-        <p:style>
-          <a:lnRef idx="2">
-            <a:schemeClr val="accent1">
-              <a:shade val="50000"/>
-            </a:schemeClr>
-          </a:lnRef>
-          <a:fillRef idx="1">
-            <a:schemeClr val="accent1"/>
-          </a:fillRef>
-          <a:effectRef idx="0">
-            <a:schemeClr val="accent1"/>
-          </a:effectRef>
-          <a:fontRef idx="minor">
-            <a:schemeClr val="lt1"/>
-          </a:fontRef>
-        </p:style>
-        <p:txBody>
-          <a:bodyPr rtlCol="0" anchor="ctr"/>
-          <a:lstStyle/>
-          <a:p>
-            <a:pPr algn="ctr"/>
-            <a:r>
-              <a:rPr lang="de-DE" sz="3200" dirty="0" smtClean="0">
-                <a:solidFill>
-                  <a:schemeClr val="tx1"/>
-                </a:solidFill>
-              </a:rPr>
-              <a:t>Neocortex</a:t>
-            </a:r>
-            <a:endParaRPr lang="de-DE" sz="3200" dirty="0">
-              <a:solidFill>
-                <a:schemeClr val="tx1"/>
-              </a:solidFill>
-            </a:endParaRPr>
+            <a:endParaRPr lang="de-DE"/>
           </a:p>
         </p:txBody>
       </p:sp>
       <p:cxnSp>
         <p:nvCxnSpPr>
-          <p:cNvPr id="9" name="Straight Arrow Connector 8"/>
+          <p:cNvPr id="10" name="Straight Arrow Connector 9"/>
           <p:cNvCxnSpPr/>
           <p:nvPr/>
         </p:nvCxnSpPr>
         <p:spPr>
-          <a:xfrm flipH="1">
-            <a:off x="1821976" y="4339988"/>
-            <a:ext cx="13648" cy="1173709"/>
+          <a:xfrm>
+            <a:off x="2709081" y="1610436"/>
+            <a:ext cx="1944806" cy="822953"/>
           </a:xfrm>
           <a:prstGeom prst="straightConnector1">
             <a:avLst/>
           </a:prstGeom>
           <a:ln w="57150">
+            <a:solidFill>
+              <a:srgbClr val="002060"/>
+            </a:solidFill>
             <a:tailEnd type="triangle"/>
           </a:ln>
         </p:spPr>
@@ -3882,186 +5541,24 @@
           </a:fontRef>
         </p:style>
       </p:cxnSp>
-      <p:cxnSp>
-        <p:nvCxnSpPr>
-          <p:cNvPr id="11" name="Straight Arrow Connector 10"/>
-          <p:cNvCxnSpPr/>
-          <p:nvPr/>
-        </p:nvCxnSpPr>
-        <p:spPr>
-          <a:xfrm flipV="1">
-            <a:off x="3684895" y="3548840"/>
-            <a:ext cx="2213213" cy="13226"/>
-          </a:xfrm>
-          <a:prstGeom prst="straightConnector1">
-            <a:avLst/>
-          </a:prstGeom>
-          <a:ln w="57150">
-            <a:tailEnd type="triangle"/>
+      <p:sp>
+        <p:nvSpPr>
+          <p:cNvPr id="13" name="TextBox 12"/>
+          <p:cNvSpPr txBox="1"/>
+          <p:nvPr/>
+        </p:nvSpPr>
+        <p:spPr>
+          <a:xfrm>
+            <a:off x="851039" y="1087216"/>
+            <a:ext cx="1769331" cy="523220"/>
+          </a:xfrm>
+          <a:prstGeom prst="rect">
+            <a:avLst/>
+          </a:prstGeom>
+          <a:noFill/>
+          <a:ln>
+            <a:noFill/>
           </a:ln>
-        </p:spPr>
-        <p:style>
-          <a:lnRef idx="1">
-            <a:schemeClr val="accent1"/>
-          </a:lnRef>
-          <a:fillRef idx="0">
-            <a:schemeClr val="accent1"/>
-          </a:fillRef>
-          <a:effectRef idx="0">
-            <a:schemeClr val="accent1"/>
-          </a:effectRef>
-          <a:fontRef idx="minor">
-            <a:schemeClr val="tx1"/>
-          </a:fontRef>
-        </p:style>
-      </p:cxnSp>
-      <p:cxnSp>
-        <p:nvCxnSpPr>
-          <p:cNvPr id="13" name="Straight Arrow Connector 12"/>
-          <p:cNvCxnSpPr/>
-          <p:nvPr/>
-        </p:nvCxnSpPr>
-        <p:spPr>
-          <a:xfrm flipH="1">
-            <a:off x="3684895" y="3971920"/>
-            <a:ext cx="2213213" cy="13226"/>
-          </a:xfrm>
-          <a:prstGeom prst="straightConnector1">
-            <a:avLst/>
-          </a:prstGeom>
-          <a:ln w="57150">
-            <a:tailEnd type="triangle"/>
-          </a:ln>
-        </p:spPr>
-        <p:style>
-          <a:lnRef idx="1">
-            <a:schemeClr val="accent1"/>
-          </a:lnRef>
-          <a:fillRef idx="0">
-            <a:schemeClr val="accent1"/>
-          </a:fillRef>
-          <a:effectRef idx="0">
-            <a:schemeClr val="accent1"/>
-          </a:effectRef>
-          <a:fontRef idx="minor">
-            <a:schemeClr val="tx1"/>
-          </a:fontRef>
-        </p:style>
-      </p:cxnSp>
-      <p:cxnSp>
-        <p:nvCxnSpPr>
-          <p:cNvPr id="16" name="Straight Arrow Connector 15"/>
-          <p:cNvCxnSpPr/>
-          <p:nvPr/>
-        </p:nvCxnSpPr>
-        <p:spPr>
-          <a:xfrm flipV="1">
-            <a:off x="3684895" y="1931158"/>
-            <a:ext cx="2213213" cy="6824"/>
-          </a:xfrm>
-          <a:prstGeom prst="straightConnector1">
-            <a:avLst/>
-          </a:prstGeom>
-          <a:ln w="57150">
-            <a:tailEnd type="triangle"/>
-          </a:ln>
-        </p:spPr>
-        <p:style>
-          <a:lnRef idx="1">
-            <a:schemeClr val="accent1"/>
-          </a:lnRef>
-          <a:fillRef idx="0">
-            <a:schemeClr val="accent1"/>
-          </a:fillRef>
-          <a:effectRef idx="0">
-            <a:schemeClr val="accent1"/>
-          </a:effectRef>
-          <a:fontRef idx="minor">
-            <a:schemeClr val="tx1"/>
-          </a:fontRef>
-        </p:style>
-      </p:cxnSp>
-      <p:cxnSp>
-        <p:nvCxnSpPr>
-          <p:cNvPr id="19" name="Straight Arrow Connector 18"/>
-          <p:cNvCxnSpPr/>
-          <p:nvPr/>
-        </p:nvCxnSpPr>
-        <p:spPr>
-          <a:xfrm flipH="1" flipV="1">
-            <a:off x="3684895" y="2399732"/>
-            <a:ext cx="2213213" cy="6611"/>
-          </a:xfrm>
-          <a:prstGeom prst="straightConnector1">
-            <a:avLst/>
-          </a:prstGeom>
-          <a:ln w="57150">
-            <a:tailEnd type="triangle"/>
-          </a:ln>
-        </p:spPr>
-        <p:style>
-          <a:lnRef idx="1">
-            <a:schemeClr val="accent1"/>
-          </a:lnRef>
-          <a:fillRef idx="0">
-            <a:schemeClr val="accent1"/>
-          </a:fillRef>
-          <a:effectRef idx="0">
-            <a:schemeClr val="accent1"/>
-          </a:effectRef>
-          <a:fontRef idx="minor">
-            <a:schemeClr val="tx1"/>
-          </a:fontRef>
-        </p:style>
-      </p:cxnSp>
-      <p:cxnSp>
-        <p:nvCxnSpPr>
-          <p:cNvPr id="22" name="Straight Arrow Connector 21"/>
-          <p:cNvCxnSpPr/>
-          <p:nvPr/>
-        </p:nvCxnSpPr>
-        <p:spPr>
-          <a:xfrm flipH="1" flipV="1">
-            <a:off x="2599899" y="4310416"/>
-            <a:ext cx="6824" cy="1119119"/>
-          </a:xfrm>
-          <a:prstGeom prst="straightConnector1">
-            <a:avLst/>
-          </a:prstGeom>
-          <a:ln w="57150">
-            <a:tailEnd type="triangle"/>
-          </a:ln>
-        </p:spPr>
-        <p:style>
-          <a:lnRef idx="1">
-            <a:schemeClr val="accent1"/>
-          </a:lnRef>
-          <a:fillRef idx="0">
-            <a:schemeClr val="accent1"/>
-          </a:fillRef>
-          <a:effectRef idx="0">
-            <a:schemeClr val="accent1"/>
-          </a:effectRef>
-          <a:fontRef idx="minor">
-            <a:schemeClr val="tx1"/>
-          </a:fontRef>
-        </p:style>
-      </p:cxnSp>
-      <p:sp>
-        <p:nvSpPr>
-          <p:cNvPr id="30" name="TextBox 29"/>
-          <p:cNvSpPr txBox="1"/>
-          <p:nvPr/>
-        </p:nvSpPr>
-        <p:spPr>
-          <a:xfrm>
-            <a:off x="327546" y="5581934"/>
-            <a:ext cx="1428789" cy="369332"/>
-          </a:xfrm>
-          <a:prstGeom prst="rect">
-            <a:avLst/>
-          </a:prstGeom>
-          <a:noFill/>
         </p:spPr>
         <p:txBody>
           <a:bodyPr wrap="none" rtlCol="0">
@@ -4070,112 +5567,25 @@
           <a:lstStyle/>
           <a:p>
             <a:r>
-              <a:rPr lang="de-DE" dirty="0" smtClean="0"/>
-              <a:t>Motorsignale</a:t>
-            </a:r>
-            <a:endParaRPr lang="de-DE" dirty="0"/>
-          </a:p>
-        </p:txBody>
-      </p:sp>
-      <p:sp>
-        <p:nvSpPr>
-          <p:cNvPr id="31" name="TextBox 30"/>
-          <p:cNvSpPr txBox="1"/>
-          <p:nvPr/>
-        </p:nvSpPr>
-        <p:spPr>
-          <a:xfrm>
-            <a:off x="2256106" y="5596003"/>
-            <a:ext cx="1444626" cy="369332"/>
-          </a:xfrm>
-          <a:prstGeom prst="rect">
-            <a:avLst/>
-          </a:prstGeom>
-          <a:noFill/>
-        </p:spPr>
-        <p:txBody>
-          <a:bodyPr wrap="none" rtlCol="0">
-            <a:spAutoFit/>
-          </a:bodyPr>
-          <a:lstStyle/>
-          <a:p>
-            <a:r>
-              <a:rPr lang="de-DE" dirty="0" smtClean="0"/>
-              <a:t>Sinnessignale</a:t>
-            </a:r>
-          </a:p>
-        </p:txBody>
-      </p:sp>
-      <p:sp>
-        <p:nvSpPr>
-          <p:cNvPr id="34" name="TextBox 33"/>
-          <p:cNvSpPr txBox="1"/>
-          <p:nvPr/>
-        </p:nvSpPr>
-        <p:spPr>
-          <a:xfrm>
-            <a:off x="3796352" y="2892903"/>
-            <a:ext cx="1597104" cy="646331"/>
-          </a:xfrm>
-          <a:prstGeom prst="rect">
-            <a:avLst/>
-          </a:prstGeom>
-          <a:noFill/>
-        </p:spPr>
-        <p:txBody>
-          <a:bodyPr wrap="none" rtlCol="0">
-            <a:spAutoFit/>
-          </a:bodyPr>
-          <a:lstStyle/>
-          <a:p>
-            <a:r>
-              <a:rPr lang="de-DE" dirty="0" smtClean="0"/>
-              <a:t>Motorsignale +</a:t>
-            </a:r>
-          </a:p>
-          <a:p>
-            <a:r>
-              <a:rPr lang="de-DE" dirty="0" smtClean="0"/>
-              <a:t>Sinnessignale</a:t>
-            </a:r>
-            <a:endParaRPr lang="de-DE" dirty="0"/>
-          </a:p>
-        </p:txBody>
-      </p:sp>
-      <p:sp>
-        <p:nvSpPr>
-          <p:cNvPr id="36" name="TextBox 35"/>
-          <p:cNvSpPr txBox="1"/>
-          <p:nvPr/>
-        </p:nvSpPr>
-        <p:spPr>
-          <a:xfrm>
-            <a:off x="3796352" y="4039737"/>
-            <a:ext cx="1428789" cy="369332"/>
-          </a:xfrm>
-          <a:prstGeom prst="rect">
-            <a:avLst/>
-          </a:prstGeom>
-          <a:noFill/>
-        </p:spPr>
-        <p:txBody>
-          <a:bodyPr wrap="none" rtlCol="0">
-            <a:spAutoFit/>
-          </a:bodyPr>
-          <a:lstStyle/>
-          <a:p>
-            <a:r>
-              <a:rPr lang="de-DE" dirty="0" smtClean="0"/>
-              <a:t>Motorsignale</a:t>
-            </a:r>
-            <a:endParaRPr lang="de-DE" dirty="0"/>
+              <a:rPr lang="de-DE" sz="2800" b="1" dirty="0" smtClean="0">
+                <a:solidFill>
+                  <a:srgbClr val="002060"/>
+                </a:solidFill>
+              </a:rPr>
+              <a:t>Säugetiere</a:t>
+            </a:r>
+            <a:endParaRPr lang="de-DE" sz="2800" b="1" dirty="0">
+              <a:solidFill>
+                <a:srgbClr val="002060"/>
+              </a:solidFill>
+            </a:endParaRPr>
           </a:p>
         </p:txBody>
       </p:sp>
     </p:spTree>
     <p:extLst>
       <p:ext uri="{BB962C8B-B14F-4D97-AF65-F5344CB8AC3E}">
-        <p14:creationId xmlns:p14="http://schemas.microsoft.com/office/powerpoint/2010/main" val="2789744570"/>
+        <p14:creationId xmlns:p14="http://schemas.microsoft.com/office/powerpoint/2010/main" val="4050214015"/>
       </p:ext>
     </p:extLst>
   </p:cSld>
@@ -4204,51 +5614,484 @@
       </p:grpSpPr>
       <p:sp>
         <p:nvSpPr>
-          <p:cNvPr id="3" name="Content Placeholder 2"/>
-          <p:cNvSpPr>
-            <a:spLocks noGrp="1"/>
-          </p:cNvSpPr>
-          <p:nvPr>
-            <p:ph idx="1"/>
-          </p:nvPr>
-        </p:nvSpPr>
-        <p:spPr>
-          <a:xfrm>
-            <a:off x="838200" y="450376"/>
-            <a:ext cx="10515600" cy="5726587"/>
-          </a:xfrm>
-        </p:spPr>
-        <p:txBody>
-          <a:bodyPr/>
-          <a:lstStyle/>
-          <a:p>
-            <a:pPr marL="0" indent="0">
-              <a:buNone/>
-            </a:pPr>
+          <p:cNvPr id="5" name="Rectangle 4"/>
+          <p:cNvSpPr/>
+          <p:nvPr/>
+        </p:nvSpPr>
+        <p:spPr>
+          <a:xfrm>
+            <a:off x="968991" y="1599062"/>
+            <a:ext cx="2715904" cy="1105469"/>
+          </a:xfrm>
+          <a:prstGeom prst="rect">
+            <a:avLst/>
+          </a:prstGeom>
+          <a:noFill/>
+          <a:ln w="57150"/>
+        </p:spPr>
+        <p:style>
+          <a:lnRef idx="2">
+            <a:schemeClr val="accent1">
+              <a:shade val="50000"/>
+            </a:schemeClr>
+          </a:lnRef>
+          <a:fillRef idx="1">
+            <a:schemeClr val="accent1"/>
+          </a:fillRef>
+          <a:effectRef idx="0">
+            <a:schemeClr val="accent1"/>
+          </a:effectRef>
+          <a:fontRef idx="minor">
+            <a:schemeClr val="lt1"/>
+          </a:fontRef>
+        </p:style>
+        <p:txBody>
+          <a:bodyPr rtlCol="0" anchor="ctr"/>
+          <a:lstStyle/>
+          <a:p>
+            <a:pPr algn="ctr"/>
+            <a:r>
+              <a:rPr lang="de-DE" sz="2400" dirty="0" smtClean="0">
+                <a:solidFill>
+                  <a:schemeClr val="tx1"/>
+                </a:solidFill>
+              </a:rPr>
+              <a:t>Hippocampus</a:t>
+            </a:r>
+            <a:endParaRPr lang="de-DE" sz="2400" dirty="0">
+              <a:solidFill>
+                <a:schemeClr val="tx1"/>
+              </a:solidFill>
+            </a:endParaRPr>
+          </a:p>
+        </p:txBody>
+      </p:sp>
+      <p:sp>
+        <p:nvSpPr>
+          <p:cNvPr id="6" name="Rectangle 5"/>
+          <p:cNvSpPr/>
+          <p:nvPr/>
+        </p:nvSpPr>
+        <p:spPr>
+          <a:xfrm>
+            <a:off x="968991" y="3234519"/>
+            <a:ext cx="2715904" cy="1105469"/>
+          </a:xfrm>
+          <a:prstGeom prst="rect">
+            <a:avLst/>
+          </a:prstGeom>
+          <a:noFill/>
+          <a:ln w="57150"/>
+        </p:spPr>
+        <p:style>
+          <a:lnRef idx="2">
+            <a:schemeClr val="accent1">
+              <a:shade val="50000"/>
+            </a:schemeClr>
+          </a:lnRef>
+          <a:fillRef idx="1">
+            <a:schemeClr val="accent1"/>
+          </a:fillRef>
+          <a:effectRef idx="0">
+            <a:schemeClr val="accent1"/>
+          </a:effectRef>
+          <a:fontRef idx="minor">
+            <a:schemeClr val="lt1"/>
+          </a:fontRef>
+        </p:style>
+        <p:txBody>
+          <a:bodyPr rtlCol="0" anchor="ctr"/>
+          <a:lstStyle/>
+          <a:p>
+            <a:pPr algn="ctr"/>
+            <a:r>
+              <a:rPr lang="de-DE" sz="2400" dirty="0" smtClean="0">
+                <a:solidFill>
+                  <a:schemeClr val="tx1"/>
+                </a:solidFill>
+              </a:rPr>
+              <a:t>Thalamus</a:t>
+            </a:r>
+            <a:endParaRPr lang="de-DE" dirty="0">
+              <a:solidFill>
+                <a:schemeClr val="tx1"/>
+              </a:solidFill>
+            </a:endParaRPr>
+          </a:p>
+        </p:txBody>
+      </p:sp>
+      <p:sp>
+        <p:nvSpPr>
+          <p:cNvPr id="7" name="Rectangle 6"/>
+          <p:cNvSpPr/>
+          <p:nvPr/>
+        </p:nvSpPr>
+        <p:spPr>
+          <a:xfrm>
+            <a:off x="5898108" y="893928"/>
+            <a:ext cx="5333999" cy="4535607"/>
+          </a:xfrm>
+          <a:prstGeom prst="rect">
+            <a:avLst/>
+          </a:prstGeom>
+          <a:noFill/>
+          <a:ln w="57150"/>
+        </p:spPr>
+        <p:style>
+          <a:lnRef idx="2">
+            <a:schemeClr val="accent1">
+              <a:shade val="50000"/>
+            </a:schemeClr>
+          </a:lnRef>
+          <a:fillRef idx="1">
+            <a:schemeClr val="accent1"/>
+          </a:fillRef>
+          <a:effectRef idx="0">
+            <a:schemeClr val="accent1"/>
+          </a:effectRef>
+          <a:fontRef idx="minor">
+            <a:schemeClr val="lt1"/>
+          </a:fontRef>
+        </p:style>
+        <p:txBody>
+          <a:bodyPr rtlCol="0" anchor="ctr"/>
+          <a:lstStyle/>
+          <a:p>
+            <a:pPr algn="ctr"/>
+            <a:r>
+              <a:rPr lang="de-DE" sz="3200" dirty="0" smtClean="0">
+                <a:solidFill>
+                  <a:schemeClr val="tx1"/>
+                </a:solidFill>
+              </a:rPr>
+              <a:t>Neocortex</a:t>
+            </a:r>
+            <a:endParaRPr lang="de-DE" sz="3200" dirty="0">
+              <a:solidFill>
+                <a:schemeClr val="tx1"/>
+              </a:solidFill>
+            </a:endParaRPr>
+          </a:p>
+        </p:txBody>
+      </p:sp>
+      <p:cxnSp>
+        <p:nvCxnSpPr>
+          <p:cNvPr id="9" name="Straight Arrow Connector 8"/>
+          <p:cNvCxnSpPr/>
+          <p:nvPr/>
+        </p:nvCxnSpPr>
+        <p:spPr>
+          <a:xfrm flipH="1">
+            <a:off x="1821976" y="4339988"/>
+            <a:ext cx="13648" cy="1173709"/>
+          </a:xfrm>
+          <a:prstGeom prst="straightConnector1">
+            <a:avLst/>
+          </a:prstGeom>
+          <a:ln w="57150">
+            <a:tailEnd type="triangle"/>
+          </a:ln>
+        </p:spPr>
+        <p:style>
+          <a:lnRef idx="1">
+            <a:schemeClr val="accent1"/>
+          </a:lnRef>
+          <a:fillRef idx="0">
+            <a:schemeClr val="accent1"/>
+          </a:fillRef>
+          <a:effectRef idx="0">
+            <a:schemeClr val="accent1"/>
+          </a:effectRef>
+          <a:fontRef idx="minor">
+            <a:schemeClr val="tx1"/>
+          </a:fontRef>
+        </p:style>
+      </p:cxnSp>
+      <p:cxnSp>
+        <p:nvCxnSpPr>
+          <p:cNvPr id="11" name="Straight Arrow Connector 10"/>
+          <p:cNvCxnSpPr/>
+          <p:nvPr/>
+        </p:nvCxnSpPr>
+        <p:spPr>
+          <a:xfrm flipV="1">
+            <a:off x="3684895" y="3548840"/>
+            <a:ext cx="2213213" cy="13226"/>
+          </a:xfrm>
+          <a:prstGeom prst="straightConnector1">
+            <a:avLst/>
+          </a:prstGeom>
+          <a:ln w="57150">
+            <a:tailEnd type="triangle"/>
+          </a:ln>
+        </p:spPr>
+        <p:style>
+          <a:lnRef idx="1">
+            <a:schemeClr val="accent1"/>
+          </a:lnRef>
+          <a:fillRef idx="0">
+            <a:schemeClr val="accent1"/>
+          </a:fillRef>
+          <a:effectRef idx="0">
+            <a:schemeClr val="accent1"/>
+          </a:effectRef>
+          <a:fontRef idx="minor">
+            <a:schemeClr val="tx1"/>
+          </a:fontRef>
+        </p:style>
+      </p:cxnSp>
+      <p:cxnSp>
+        <p:nvCxnSpPr>
+          <p:cNvPr id="13" name="Straight Arrow Connector 12"/>
+          <p:cNvCxnSpPr/>
+          <p:nvPr/>
+        </p:nvCxnSpPr>
+        <p:spPr>
+          <a:xfrm flipH="1">
+            <a:off x="3684895" y="3971920"/>
+            <a:ext cx="2213213" cy="13226"/>
+          </a:xfrm>
+          <a:prstGeom prst="straightConnector1">
+            <a:avLst/>
+          </a:prstGeom>
+          <a:ln w="57150">
+            <a:tailEnd type="triangle"/>
+          </a:ln>
+        </p:spPr>
+        <p:style>
+          <a:lnRef idx="1">
+            <a:schemeClr val="accent1"/>
+          </a:lnRef>
+          <a:fillRef idx="0">
+            <a:schemeClr val="accent1"/>
+          </a:fillRef>
+          <a:effectRef idx="0">
+            <a:schemeClr val="accent1"/>
+          </a:effectRef>
+          <a:fontRef idx="minor">
+            <a:schemeClr val="tx1"/>
+          </a:fontRef>
+        </p:style>
+      </p:cxnSp>
+      <p:cxnSp>
+        <p:nvCxnSpPr>
+          <p:cNvPr id="16" name="Straight Arrow Connector 15"/>
+          <p:cNvCxnSpPr/>
+          <p:nvPr/>
+        </p:nvCxnSpPr>
+        <p:spPr>
+          <a:xfrm flipV="1">
+            <a:off x="3684895" y="1931158"/>
+            <a:ext cx="2213213" cy="6824"/>
+          </a:xfrm>
+          <a:prstGeom prst="straightConnector1">
+            <a:avLst/>
+          </a:prstGeom>
+          <a:ln w="57150">
+            <a:tailEnd type="triangle"/>
+          </a:ln>
+        </p:spPr>
+        <p:style>
+          <a:lnRef idx="1">
+            <a:schemeClr val="accent1"/>
+          </a:lnRef>
+          <a:fillRef idx="0">
+            <a:schemeClr val="accent1"/>
+          </a:fillRef>
+          <a:effectRef idx="0">
+            <a:schemeClr val="accent1"/>
+          </a:effectRef>
+          <a:fontRef idx="minor">
+            <a:schemeClr val="tx1"/>
+          </a:fontRef>
+        </p:style>
+      </p:cxnSp>
+      <p:cxnSp>
+        <p:nvCxnSpPr>
+          <p:cNvPr id="19" name="Straight Arrow Connector 18"/>
+          <p:cNvCxnSpPr/>
+          <p:nvPr/>
+        </p:nvCxnSpPr>
+        <p:spPr>
+          <a:xfrm flipH="1" flipV="1">
+            <a:off x="3684895" y="2399732"/>
+            <a:ext cx="2213213" cy="6611"/>
+          </a:xfrm>
+          <a:prstGeom prst="straightConnector1">
+            <a:avLst/>
+          </a:prstGeom>
+          <a:ln w="57150">
+            <a:tailEnd type="triangle"/>
+          </a:ln>
+        </p:spPr>
+        <p:style>
+          <a:lnRef idx="1">
+            <a:schemeClr val="accent1"/>
+          </a:lnRef>
+          <a:fillRef idx="0">
+            <a:schemeClr val="accent1"/>
+          </a:fillRef>
+          <a:effectRef idx="0">
+            <a:schemeClr val="accent1"/>
+          </a:effectRef>
+          <a:fontRef idx="minor">
+            <a:schemeClr val="tx1"/>
+          </a:fontRef>
+        </p:style>
+      </p:cxnSp>
+      <p:cxnSp>
+        <p:nvCxnSpPr>
+          <p:cNvPr id="22" name="Straight Arrow Connector 21"/>
+          <p:cNvCxnSpPr/>
+          <p:nvPr/>
+        </p:nvCxnSpPr>
+        <p:spPr>
+          <a:xfrm flipH="1" flipV="1">
+            <a:off x="2599899" y="4310416"/>
+            <a:ext cx="6824" cy="1119119"/>
+          </a:xfrm>
+          <a:prstGeom prst="straightConnector1">
+            <a:avLst/>
+          </a:prstGeom>
+          <a:ln w="57150">
+            <a:tailEnd type="triangle"/>
+          </a:ln>
+        </p:spPr>
+        <p:style>
+          <a:lnRef idx="1">
+            <a:schemeClr val="accent1"/>
+          </a:lnRef>
+          <a:fillRef idx="0">
+            <a:schemeClr val="accent1"/>
+          </a:fillRef>
+          <a:effectRef idx="0">
+            <a:schemeClr val="accent1"/>
+          </a:effectRef>
+          <a:fontRef idx="minor">
+            <a:schemeClr val="tx1"/>
+          </a:fontRef>
+        </p:style>
+      </p:cxnSp>
+      <p:sp>
+        <p:nvSpPr>
+          <p:cNvPr id="30" name="TextBox 29"/>
+          <p:cNvSpPr txBox="1"/>
+          <p:nvPr/>
+        </p:nvSpPr>
+        <p:spPr>
+          <a:xfrm>
+            <a:off x="327546" y="5581934"/>
+            <a:ext cx="1428789" cy="369332"/>
+          </a:xfrm>
+          <a:prstGeom prst="rect">
+            <a:avLst/>
+          </a:prstGeom>
+          <a:noFill/>
+        </p:spPr>
+        <p:txBody>
+          <a:bodyPr wrap="none" rtlCol="0">
+            <a:spAutoFit/>
+          </a:bodyPr>
+          <a:lstStyle/>
+          <a:p>
             <a:r>
               <a:rPr lang="de-DE" dirty="0" smtClean="0"/>
-              <a:t>Quellen:</a:t>
-            </a:r>
-          </a:p>
-          <a:p>
-            <a:pPr marL="0" indent="0">
-              <a:buNone/>
-            </a:pPr>
+              <a:t>Motorsignale</a:t>
+            </a:r>
             <a:endParaRPr lang="de-DE" dirty="0"/>
           </a:p>
-          <a:p>
-            <a:pPr marL="0" indent="0">
-              <a:buNone/>
-            </a:pPr>
-            <a:endParaRPr lang="de-DE" dirty="0" smtClean="0"/>
-          </a:p>
-          <a:p>
-            <a:pPr marL="0" indent="0">
-              <a:buNone/>
-            </a:pPr>
+        </p:txBody>
+      </p:sp>
+      <p:sp>
+        <p:nvSpPr>
+          <p:cNvPr id="31" name="TextBox 30"/>
+          <p:cNvSpPr txBox="1"/>
+          <p:nvPr/>
+        </p:nvSpPr>
+        <p:spPr>
+          <a:xfrm>
+            <a:off x="2256106" y="5596003"/>
+            <a:ext cx="1444626" cy="369332"/>
+          </a:xfrm>
+          <a:prstGeom prst="rect">
+            <a:avLst/>
+          </a:prstGeom>
+          <a:noFill/>
+        </p:spPr>
+        <p:txBody>
+          <a:bodyPr wrap="none" rtlCol="0">
+            <a:spAutoFit/>
+          </a:bodyPr>
+          <a:lstStyle/>
+          <a:p>
             <a:r>
               <a:rPr lang="de-DE" dirty="0" smtClean="0"/>
-              <a:t>Weiterführende Informationen:</a:t>
+              <a:t>Sinnessignale</a:t>
+            </a:r>
+          </a:p>
+        </p:txBody>
+      </p:sp>
+      <p:sp>
+        <p:nvSpPr>
+          <p:cNvPr id="34" name="TextBox 33"/>
+          <p:cNvSpPr txBox="1"/>
+          <p:nvPr/>
+        </p:nvSpPr>
+        <p:spPr>
+          <a:xfrm>
+            <a:off x="3796352" y="2892903"/>
+            <a:ext cx="1597104" cy="646331"/>
+          </a:xfrm>
+          <a:prstGeom prst="rect">
+            <a:avLst/>
+          </a:prstGeom>
+          <a:noFill/>
+        </p:spPr>
+        <p:txBody>
+          <a:bodyPr wrap="none" rtlCol="0">
+            <a:spAutoFit/>
+          </a:bodyPr>
+          <a:lstStyle/>
+          <a:p>
+            <a:r>
+              <a:rPr lang="de-DE" dirty="0" smtClean="0"/>
+              <a:t>Motorsignale +</a:t>
+            </a:r>
+          </a:p>
+          <a:p>
+            <a:r>
+              <a:rPr lang="de-DE" dirty="0" smtClean="0"/>
+              <a:t>Sinnessignale</a:t>
+            </a:r>
+            <a:endParaRPr lang="de-DE" dirty="0"/>
+          </a:p>
+        </p:txBody>
+      </p:sp>
+      <p:sp>
+        <p:nvSpPr>
+          <p:cNvPr id="36" name="TextBox 35"/>
+          <p:cNvSpPr txBox="1"/>
+          <p:nvPr/>
+        </p:nvSpPr>
+        <p:spPr>
+          <a:xfrm>
+            <a:off x="3796352" y="4039737"/>
+            <a:ext cx="1428789" cy="369332"/>
+          </a:xfrm>
+          <a:prstGeom prst="rect">
+            <a:avLst/>
+          </a:prstGeom>
+          <a:noFill/>
+        </p:spPr>
+        <p:txBody>
+          <a:bodyPr wrap="none" rtlCol="0">
+            <a:spAutoFit/>
+          </a:bodyPr>
+          <a:lstStyle/>
+          <a:p>
+            <a:r>
+              <a:rPr lang="de-DE" dirty="0" smtClean="0"/>
+              <a:t>Motorsignale</a:t>
             </a:r>
             <a:endParaRPr lang="de-DE" dirty="0"/>
           </a:p>
@@ -4257,7 +6100,612 @@
     </p:spTree>
     <p:extLst>
       <p:ext uri="{BB962C8B-B14F-4D97-AF65-F5344CB8AC3E}">
-        <p14:creationId xmlns:p14="http://schemas.microsoft.com/office/powerpoint/2010/main" val="944380725"/>
+        <p14:creationId xmlns:p14="http://schemas.microsoft.com/office/powerpoint/2010/main" val="2789744570"/>
+      </p:ext>
+    </p:extLst>
+  </p:cSld>
+  <p:clrMapOvr>
+    <a:masterClrMapping/>
+  </p:clrMapOvr>
+</p:sld>
+</file>
+
+<file path=ppt/slides/slide8.xml><?xml version="1.0" encoding="utf-8"?>
+<p:sld xmlns:a="http://schemas.openxmlformats.org/drawingml/2006/main" xmlns:r="http://schemas.openxmlformats.org/officeDocument/2006/relationships" xmlns:p="http://schemas.openxmlformats.org/presentationml/2006/main">
+  <p:cSld>
+    <p:spTree>
+      <p:nvGrpSpPr>
+        <p:cNvPr id="1" name=""/>
+        <p:cNvGrpSpPr/>
+        <p:nvPr/>
+      </p:nvGrpSpPr>
+      <p:grpSpPr>
+        <a:xfrm>
+          <a:off x="0" y="0"/>
+          <a:ext cx="0" cy="0"/>
+          <a:chOff x="0" y="0"/>
+          <a:chExt cx="0" cy="0"/>
+        </a:xfrm>
+      </p:grpSpPr>
+      <p:sp>
+        <p:nvSpPr>
+          <p:cNvPr id="5" name="Rectangle 4"/>
+          <p:cNvSpPr/>
+          <p:nvPr/>
+        </p:nvSpPr>
+        <p:spPr>
+          <a:xfrm>
+            <a:off x="968991" y="1599062"/>
+            <a:ext cx="2715904" cy="1105469"/>
+          </a:xfrm>
+          <a:prstGeom prst="rect">
+            <a:avLst/>
+          </a:prstGeom>
+          <a:noFill/>
+          <a:ln w="57150"/>
+        </p:spPr>
+        <p:style>
+          <a:lnRef idx="2">
+            <a:schemeClr val="accent1">
+              <a:shade val="50000"/>
+            </a:schemeClr>
+          </a:lnRef>
+          <a:fillRef idx="1">
+            <a:schemeClr val="accent1"/>
+          </a:fillRef>
+          <a:effectRef idx="0">
+            <a:schemeClr val="accent1"/>
+          </a:effectRef>
+          <a:fontRef idx="minor">
+            <a:schemeClr val="lt1"/>
+          </a:fontRef>
+        </p:style>
+        <p:txBody>
+          <a:bodyPr rtlCol="0" anchor="ctr"/>
+          <a:lstStyle/>
+          <a:p>
+            <a:pPr algn="ctr"/>
+            <a:r>
+              <a:rPr lang="de-DE" sz="2400" dirty="0" smtClean="0">
+                <a:solidFill>
+                  <a:schemeClr val="tx1"/>
+                </a:solidFill>
+              </a:rPr>
+              <a:t>Hippocampus</a:t>
+            </a:r>
+            <a:endParaRPr lang="de-DE" sz="2400" dirty="0">
+              <a:solidFill>
+                <a:schemeClr val="tx1"/>
+              </a:solidFill>
+            </a:endParaRPr>
+          </a:p>
+        </p:txBody>
+      </p:sp>
+      <p:sp>
+        <p:nvSpPr>
+          <p:cNvPr id="6" name="Rectangle 5"/>
+          <p:cNvSpPr/>
+          <p:nvPr/>
+        </p:nvSpPr>
+        <p:spPr>
+          <a:xfrm>
+            <a:off x="968991" y="3234519"/>
+            <a:ext cx="2715904" cy="1105469"/>
+          </a:xfrm>
+          <a:prstGeom prst="rect">
+            <a:avLst/>
+          </a:prstGeom>
+          <a:noFill/>
+          <a:ln w="57150"/>
+        </p:spPr>
+        <p:style>
+          <a:lnRef idx="2">
+            <a:schemeClr val="accent1">
+              <a:shade val="50000"/>
+            </a:schemeClr>
+          </a:lnRef>
+          <a:fillRef idx="1">
+            <a:schemeClr val="accent1"/>
+          </a:fillRef>
+          <a:effectRef idx="0">
+            <a:schemeClr val="accent1"/>
+          </a:effectRef>
+          <a:fontRef idx="minor">
+            <a:schemeClr val="lt1"/>
+          </a:fontRef>
+        </p:style>
+        <p:txBody>
+          <a:bodyPr rtlCol="0" anchor="ctr"/>
+          <a:lstStyle/>
+          <a:p>
+            <a:pPr algn="ctr"/>
+            <a:r>
+              <a:rPr lang="de-DE" sz="2400" dirty="0" smtClean="0">
+                <a:solidFill>
+                  <a:schemeClr val="tx1"/>
+                </a:solidFill>
+              </a:rPr>
+              <a:t>Thalamus</a:t>
+            </a:r>
+            <a:endParaRPr lang="de-DE" dirty="0">
+              <a:solidFill>
+                <a:schemeClr val="tx1"/>
+              </a:solidFill>
+            </a:endParaRPr>
+          </a:p>
+        </p:txBody>
+      </p:sp>
+      <p:sp>
+        <p:nvSpPr>
+          <p:cNvPr id="7" name="Rectangle 6"/>
+          <p:cNvSpPr/>
+          <p:nvPr/>
+        </p:nvSpPr>
+        <p:spPr>
+          <a:xfrm>
+            <a:off x="5898108" y="893928"/>
+            <a:ext cx="5333999" cy="4535607"/>
+          </a:xfrm>
+          <a:prstGeom prst="rect">
+            <a:avLst/>
+          </a:prstGeom>
+          <a:noFill/>
+          <a:ln w="57150"/>
+        </p:spPr>
+        <p:style>
+          <a:lnRef idx="2">
+            <a:schemeClr val="accent1">
+              <a:shade val="50000"/>
+            </a:schemeClr>
+          </a:lnRef>
+          <a:fillRef idx="1">
+            <a:schemeClr val="accent1"/>
+          </a:fillRef>
+          <a:effectRef idx="0">
+            <a:schemeClr val="accent1"/>
+          </a:effectRef>
+          <a:fontRef idx="minor">
+            <a:schemeClr val="lt1"/>
+          </a:fontRef>
+        </p:style>
+        <p:txBody>
+          <a:bodyPr rtlCol="0" anchor="ctr"/>
+          <a:lstStyle/>
+          <a:p>
+            <a:pPr algn="ctr"/>
+            <a:r>
+              <a:rPr lang="de-DE" sz="3200" dirty="0" smtClean="0">
+                <a:solidFill>
+                  <a:schemeClr val="tx1"/>
+                </a:solidFill>
+              </a:rPr>
+              <a:t>Neocortex</a:t>
+            </a:r>
+            <a:endParaRPr lang="de-DE" sz="3200" dirty="0">
+              <a:solidFill>
+                <a:schemeClr val="tx1"/>
+              </a:solidFill>
+            </a:endParaRPr>
+          </a:p>
+        </p:txBody>
+      </p:sp>
+      <p:cxnSp>
+        <p:nvCxnSpPr>
+          <p:cNvPr id="9" name="Straight Arrow Connector 8"/>
+          <p:cNvCxnSpPr/>
+          <p:nvPr/>
+        </p:nvCxnSpPr>
+        <p:spPr>
+          <a:xfrm flipH="1">
+            <a:off x="1821976" y="4339988"/>
+            <a:ext cx="13648" cy="1173709"/>
+          </a:xfrm>
+          <a:prstGeom prst="straightConnector1">
+            <a:avLst/>
+          </a:prstGeom>
+          <a:ln w="57150">
+            <a:tailEnd type="triangle"/>
+          </a:ln>
+        </p:spPr>
+        <p:style>
+          <a:lnRef idx="1">
+            <a:schemeClr val="accent1"/>
+          </a:lnRef>
+          <a:fillRef idx="0">
+            <a:schemeClr val="accent1"/>
+          </a:fillRef>
+          <a:effectRef idx="0">
+            <a:schemeClr val="accent1"/>
+          </a:effectRef>
+          <a:fontRef idx="minor">
+            <a:schemeClr val="tx1"/>
+          </a:fontRef>
+        </p:style>
+      </p:cxnSp>
+      <p:cxnSp>
+        <p:nvCxnSpPr>
+          <p:cNvPr id="11" name="Straight Arrow Connector 10"/>
+          <p:cNvCxnSpPr/>
+          <p:nvPr/>
+        </p:nvCxnSpPr>
+        <p:spPr>
+          <a:xfrm flipV="1">
+            <a:off x="3684895" y="3548840"/>
+            <a:ext cx="2213213" cy="13226"/>
+          </a:xfrm>
+          <a:prstGeom prst="straightConnector1">
+            <a:avLst/>
+          </a:prstGeom>
+          <a:ln w="57150">
+            <a:tailEnd type="triangle"/>
+          </a:ln>
+        </p:spPr>
+        <p:style>
+          <a:lnRef idx="1">
+            <a:schemeClr val="accent1"/>
+          </a:lnRef>
+          <a:fillRef idx="0">
+            <a:schemeClr val="accent1"/>
+          </a:fillRef>
+          <a:effectRef idx="0">
+            <a:schemeClr val="accent1"/>
+          </a:effectRef>
+          <a:fontRef idx="minor">
+            <a:schemeClr val="tx1"/>
+          </a:fontRef>
+        </p:style>
+      </p:cxnSp>
+      <p:cxnSp>
+        <p:nvCxnSpPr>
+          <p:cNvPr id="13" name="Straight Arrow Connector 12"/>
+          <p:cNvCxnSpPr/>
+          <p:nvPr/>
+        </p:nvCxnSpPr>
+        <p:spPr>
+          <a:xfrm flipH="1">
+            <a:off x="3684895" y="3971920"/>
+            <a:ext cx="2213213" cy="13226"/>
+          </a:xfrm>
+          <a:prstGeom prst="straightConnector1">
+            <a:avLst/>
+          </a:prstGeom>
+          <a:ln w="57150">
+            <a:tailEnd type="triangle"/>
+          </a:ln>
+        </p:spPr>
+        <p:style>
+          <a:lnRef idx="1">
+            <a:schemeClr val="accent1"/>
+          </a:lnRef>
+          <a:fillRef idx="0">
+            <a:schemeClr val="accent1"/>
+          </a:fillRef>
+          <a:effectRef idx="0">
+            <a:schemeClr val="accent1"/>
+          </a:effectRef>
+          <a:fontRef idx="minor">
+            <a:schemeClr val="tx1"/>
+          </a:fontRef>
+        </p:style>
+      </p:cxnSp>
+      <p:cxnSp>
+        <p:nvCxnSpPr>
+          <p:cNvPr id="16" name="Straight Arrow Connector 15"/>
+          <p:cNvCxnSpPr/>
+          <p:nvPr/>
+        </p:nvCxnSpPr>
+        <p:spPr>
+          <a:xfrm flipV="1">
+            <a:off x="3684895" y="1931158"/>
+            <a:ext cx="2213213" cy="6824"/>
+          </a:xfrm>
+          <a:prstGeom prst="straightConnector1">
+            <a:avLst/>
+          </a:prstGeom>
+          <a:ln w="57150">
+            <a:tailEnd type="triangle"/>
+          </a:ln>
+        </p:spPr>
+        <p:style>
+          <a:lnRef idx="1">
+            <a:schemeClr val="accent1"/>
+          </a:lnRef>
+          <a:fillRef idx="0">
+            <a:schemeClr val="accent1"/>
+          </a:fillRef>
+          <a:effectRef idx="0">
+            <a:schemeClr val="accent1"/>
+          </a:effectRef>
+          <a:fontRef idx="minor">
+            <a:schemeClr val="tx1"/>
+          </a:fontRef>
+        </p:style>
+      </p:cxnSp>
+      <p:cxnSp>
+        <p:nvCxnSpPr>
+          <p:cNvPr id="19" name="Straight Arrow Connector 18"/>
+          <p:cNvCxnSpPr/>
+          <p:nvPr/>
+        </p:nvCxnSpPr>
+        <p:spPr>
+          <a:xfrm flipH="1" flipV="1">
+            <a:off x="3684895" y="2399732"/>
+            <a:ext cx="2213213" cy="6611"/>
+          </a:xfrm>
+          <a:prstGeom prst="straightConnector1">
+            <a:avLst/>
+          </a:prstGeom>
+          <a:ln w="57150">
+            <a:tailEnd type="triangle"/>
+          </a:ln>
+        </p:spPr>
+        <p:style>
+          <a:lnRef idx="1">
+            <a:schemeClr val="accent1"/>
+          </a:lnRef>
+          <a:fillRef idx="0">
+            <a:schemeClr val="accent1"/>
+          </a:fillRef>
+          <a:effectRef idx="0">
+            <a:schemeClr val="accent1"/>
+          </a:effectRef>
+          <a:fontRef idx="minor">
+            <a:schemeClr val="tx1"/>
+          </a:fontRef>
+        </p:style>
+      </p:cxnSp>
+      <p:cxnSp>
+        <p:nvCxnSpPr>
+          <p:cNvPr id="22" name="Straight Arrow Connector 21"/>
+          <p:cNvCxnSpPr/>
+          <p:nvPr/>
+        </p:nvCxnSpPr>
+        <p:spPr>
+          <a:xfrm flipH="1" flipV="1">
+            <a:off x="2599899" y="4310416"/>
+            <a:ext cx="6824" cy="1119119"/>
+          </a:xfrm>
+          <a:prstGeom prst="straightConnector1">
+            <a:avLst/>
+          </a:prstGeom>
+          <a:ln w="57150">
+            <a:tailEnd type="triangle"/>
+          </a:ln>
+        </p:spPr>
+        <p:style>
+          <a:lnRef idx="1">
+            <a:schemeClr val="accent1"/>
+          </a:lnRef>
+          <a:fillRef idx="0">
+            <a:schemeClr val="accent1"/>
+          </a:fillRef>
+          <a:effectRef idx="0">
+            <a:schemeClr val="accent1"/>
+          </a:effectRef>
+          <a:fontRef idx="minor">
+            <a:schemeClr val="tx1"/>
+          </a:fontRef>
+        </p:style>
+      </p:cxnSp>
+      <p:sp>
+        <p:nvSpPr>
+          <p:cNvPr id="30" name="TextBox 29"/>
+          <p:cNvSpPr txBox="1"/>
+          <p:nvPr/>
+        </p:nvSpPr>
+        <p:spPr>
+          <a:xfrm>
+            <a:off x="327546" y="5581934"/>
+            <a:ext cx="1428789" cy="369332"/>
+          </a:xfrm>
+          <a:prstGeom prst="rect">
+            <a:avLst/>
+          </a:prstGeom>
+          <a:noFill/>
+        </p:spPr>
+        <p:txBody>
+          <a:bodyPr wrap="none" rtlCol="0">
+            <a:spAutoFit/>
+          </a:bodyPr>
+          <a:lstStyle/>
+          <a:p>
+            <a:r>
+              <a:rPr lang="de-DE" dirty="0" smtClean="0"/>
+              <a:t>Motorsignale</a:t>
+            </a:r>
+            <a:endParaRPr lang="de-DE" dirty="0"/>
+          </a:p>
+        </p:txBody>
+      </p:sp>
+      <p:sp>
+        <p:nvSpPr>
+          <p:cNvPr id="31" name="TextBox 30"/>
+          <p:cNvSpPr txBox="1"/>
+          <p:nvPr/>
+        </p:nvSpPr>
+        <p:spPr>
+          <a:xfrm>
+            <a:off x="2256106" y="5596003"/>
+            <a:ext cx="1444626" cy="369332"/>
+          </a:xfrm>
+          <a:prstGeom prst="rect">
+            <a:avLst/>
+          </a:prstGeom>
+          <a:noFill/>
+        </p:spPr>
+        <p:txBody>
+          <a:bodyPr wrap="none" rtlCol="0">
+            <a:spAutoFit/>
+          </a:bodyPr>
+          <a:lstStyle/>
+          <a:p>
+            <a:r>
+              <a:rPr lang="de-DE" dirty="0" smtClean="0"/>
+              <a:t>Sinnessignale</a:t>
+            </a:r>
+          </a:p>
+        </p:txBody>
+      </p:sp>
+      <p:sp>
+        <p:nvSpPr>
+          <p:cNvPr id="34" name="TextBox 33"/>
+          <p:cNvSpPr txBox="1"/>
+          <p:nvPr/>
+        </p:nvSpPr>
+        <p:spPr>
+          <a:xfrm>
+            <a:off x="3796352" y="2892903"/>
+            <a:ext cx="1597104" cy="646331"/>
+          </a:xfrm>
+          <a:prstGeom prst="rect">
+            <a:avLst/>
+          </a:prstGeom>
+          <a:noFill/>
+        </p:spPr>
+        <p:txBody>
+          <a:bodyPr wrap="none" rtlCol="0">
+            <a:spAutoFit/>
+          </a:bodyPr>
+          <a:lstStyle/>
+          <a:p>
+            <a:r>
+              <a:rPr lang="de-DE" dirty="0" smtClean="0"/>
+              <a:t>Motorsignale +</a:t>
+            </a:r>
+          </a:p>
+          <a:p>
+            <a:r>
+              <a:rPr lang="de-DE" dirty="0" smtClean="0"/>
+              <a:t>Sinnessignale</a:t>
+            </a:r>
+            <a:endParaRPr lang="de-DE" dirty="0"/>
+          </a:p>
+        </p:txBody>
+      </p:sp>
+      <p:sp>
+        <p:nvSpPr>
+          <p:cNvPr id="36" name="TextBox 35"/>
+          <p:cNvSpPr txBox="1"/>
+          <p:nvPr/>
+        </p:nvSpPr>
+        <p:spPr>
+          <a:xfrm>
+            <a:off x="3796352" y="4039737"/>
+            <a:ext cx="1428789" cy="369332"/>
+          </a:xfrm>
+          <a:prstGeom prst="rect">
+            <a:avLst/>
+          </a:prstGeom>
+          <a:noFill/>
+        </p:spPr>
+        <p:txBody>
+          <a:bodyPr wrap="none" rtlCol="0">
+            <a:spAutoFit/>
+          </a:bodyPr>
+          <a:lstStyle/>
+          <a:p>
+            <a:r>
+              <a:rPr lang="de-DE" dirty="0" smtClean="0"/>
+              <a:t>Motorsignale</a:t>
+            </a:r>
+            <a:endParaRPr lang="de-DE" dirty="0"/>
+          </a:p>
+        </p:txBody>
+      </p:sp>
+      <p:pic>
+        <p:nvPicPr>
+          <p:cNvPr id="15" name="Picture 14"/>
+          <p:cNvPicPr>
+            <a:picLocks noChangeAspect="1"/>
+          </p:cNvPicPr>
+          <p:nvPr/>
+        </p:nvPicPr>
+        <p:blipFill>
+          <a:blip r:embed="rId2">
+            <a:extLst>
+              <a:ext uri="{28A0092B-C50C-407E-A947-70E740481C1C}">
+                <a14:useLocalDpi xmlns:a14="http://schemas.microsoft.com/office/drawing/2010/main" val="0"/>
+              </a:ext>
+            </a:extLst>
+          </a:blip>
+          <a:stretch>
+            <a:fillRect/>
+          </a:stretch>
+        </p:blipFill>
+        <p:spPr>
+          <a:xfrm>
+            <a:off x="5134849" y="1400958"/>
+            <a:ext cx="6958326" cy="3521545"/>
+          </a:xfrm>
+          <a:prstGeom prst="rect">
+            <a:avLst/>
+          </a:prstGeom>
+        </p:spPr>
+      </p:pic>
+    </p:spTree>
+    <p:extLst>
+      <p:ext uri="{BB962C8B-B14F-4D97-AF65-F5344CB8AC3E}">
+        <p14:creationId xmlns:p14="http://schemas.microsoft.com/office/powerpoint/2010/main" val="1401434168"/>
+      </p:ext>
+    </p:extLst>
+  </p:cSld>
+  <p:clrMapOvr>
+    <a:masterClrMapping/>
+  </p:clrMapOvr>
+</p:sld>
+</file>
+
+<file path=ppt/slides/slide9.xml><?xml version="1.0" encoding="utf-8"?>
+<p:sld xmlns:a="http://schemas.openxmlformats.org/drawingml/2006/main" xmlns:r="http://schemas.openxmlformats.org/officeDocument/2006/relationships" xmlns:p="http://schemas.openxmlformats.org/presentationml/2006/main">
+  <p:cSld>
+    <p:spTree>
+      <p:nvGrpSpPr>
+        <p:cNvPr id="1" name=""/>
+        <p:cNvGrpSpPr/>
+        <p:nvPr/>
+      </p:nvGrpSpPr>
+      <p:grpSpPr>
+        <a:xfrm>
+          <a:off x="0" y="0"/>
+          <a:ext cx="0" cy="0"/>
+          <a:chOff x="0" y="0"/>
+          <a:chExt cx="0" cy="0"/>
+        </a:xfrm>
+      </p:grpSpPr>
+      <p:pic>
+        <p:nvPicPr>
+          <p:cNvPr id="5" name="Picture 4"/>
+          <p:cNvPicPr>
+            <a:picLocks noChangeAspect="1"/>
+          </p:cNvPicPr>
+          <p:nvPr/>
+        </p:nvPicPr>
+        <p:blipFill>
+          <a:blip r:embed="rId2">
+            <a:extLst>
+              <a:ext uri="{28A0092B-C50C-407E-A947-70E740481C1C}">
+                <a14:useLocalDpi xmlns:a14="http://schemas.microsoft.com/office/drawing/2010/main" val="0"/>
+              </a:ext>
+            </a:extLst>
+          </a:blip>
+          <a:stretch>
+            <a:fillRect/>
+          </a:stretch>
+        </p:blipFill>
+        <p:spPr>
+          <a:xfrm>
+            <a:off x="109181" y="171417"/>
+            <a:ext cx="11948615" cy="6501552"/>
+          </a:xfrm>
+          <a:prstGeom prst="rect">
+            <a:avLst/>
+          </a:prstGeom>
+        </p:spPr>
+      </p:pic>
+    </p:spTree>
+    <p:extLst>
+      <p:ext uri="{BB962C8B-B14F-4D97-AF65-F5344CB8AC3E}">
+        <p14:creationId xmlns:p14="http://schemas.microsoft.com/office/powerpoint/2010/main" val="2518694688"/>
       </p:ext>
     </p:extLst>
   </p:cSld>

</xml_diff>